<commit_message>
Update Module 7 - Temporal Difference Learning.pptx
</commit_message>
<xml_diff>
--- a/week_9-10/Module 7 - Temporal Difference Learning.pptx
+++ b/week_9-10/Module 7 - Temporal Difference Learning.pptx
@@ -6,7 +6,7 @@
     <p:sldMasterId id="2147483660" r:id="rId13"/>
   </p:sldMasterIdLst>
   <p:notesMasterIdLst>
-    <p:notesMasterId r:id="rId29"/>
+    <p:notesMasterId r:id="rId35"/>
   </p:notesMasterIdLst>
   <p:sldIdLst>
     <p:sldId id="256" r:id="rId14"/>
@@ -22,8 +22,14 @@
     <p:sldId id="384" r:id="rId24"/>
     <p:sldId id="385" r:id="rId25"/>
     <p:sldId id="387" r:id="rId26"/>
-    <p:sldId id="365" r:id="rId27"/>
-    <p:sldId id="305" r:id="rId28"/>
+    <p:sldId id="390" r:id="rId27"/>
+    <p:sldId id="392" r:id="rId28"/>
+    <p:sldId id="391" r:id="rId29"/>
+    <p:sldId id="393" r:id="rId30"/>
+    <p:sldId id="365" r:id="rId31"/>
+    <p:sldId id="394" r:id="rId32"/>
+    <p:sldId id="395" r:id="rId33"/>
+    <p:sldId id="305" r:id="rId34"/>
   </p:sldIdLst>
   <p:sldSz cx="12192000" cy="6858000"/>
   <p:notesSz cx="6858000" cy="9144000"/>
@@ -168,6 +174,24 @@
     <pc:chgData name="Joseph Marvin R. Imperial" userId="c5118018-74d5-4421-be4d-7197191e5b08" providerId="ADAL" clId="{70D03E3A-137A-44E5-9725-706554D6E372}"/>
     <pc:docChg chg="undo custSel addSld delSld modSld sldOrd">
       <pc:chgData name="Joseph Marvin R. Imperial" userId="c5118018-74d5-4421-be4d-7197191e5b08" providerId="ADAL" clId="{70D03E3A-137A-44E5-9725-706554D6E372}" dt="2021-04-10T13:20:12.491" v="1565" actId="47"/>
+      <pc:docMkLst>
+        <pc:docMk/>
+      </pc:docMkLst>
+    </pc:docChg>
+  </pc:docChgLst>
+  <pc:docChgLst>
+    <pc:chgData name="Joseph Marvin R. Imperial" userId="c5118018-74d5-4421-be4d-7197191e5b08" providerId="ADAL" clId="{AB9EEC7B-5938-AB4A-BBF1-2D08914B856E}"/>
+    <pc:docChg chg="addSld delSld">
+      <pc:chgData name="Joseph Marvin R. Imperial" userId="c5118018-74d5-4421-be4d-7197191e5b08" providerId="ADAL" clId="{AB9EEC7B-5938-AB4A-BBF1-2D08914B856E}" dt="2021-04-20T00:57:02.237" v="3" actId="2696"/>
+      <pc:docMkLst>
+        <pc:docMk/>
+      </pc:docMkLst>
+    </pc:docChg>
+  </pc:docChgLst>
+  <pc:docChgLst>
+    <pc:chgData name="Joseph Marvin R. Imperial" userId="c5118018-74d5-4421-be4d-7197191e5b08" providerId="ADAL" clId="{8B587F43-1B51-4416-B410-57F8B9E236B1}"/>
+    <pc:docChg chg="undo custSel addSld delSld modSld">
+      <pc:chgData name="Joseph Marvin R. Imperial" userId="c5118018-74d5-4421-be4d-7197191e5b08" providerId="ADAL" clId="{8B587F43-1B51-4416-B410-57F8B9E236B1}" dt="2021-03-24T12:30:06.351" v="559" actId="5793"/>
       <pc:docMkLst>
         <pc:docMk/>
       </pc:docMkLst>
@@ -690,24 +714,6 @@
           <pc:sldMk cId="713267183" sldId="383"/>
         </pc:sldMkLst>
       </pc:sldChg>
-    </pc:docChg>
-  </pc:docChgLst>
-  <pc:docChgLst>
-    <pc:chgData name="Joseph Marvin R. Imperial" userId="c5118018-74d5-4421-be4d-7197191e5b08" providerId="ADAL" clId="{8B587F43-1B51-4416-B410-57F8B9E236B1}"/>
-    <pc:docChg chg="undo custSel addSld delSld modSld">
-      <pc:chgData name="Joseph Marvin R. Imperial" userId="c5118018-74d5-4421-be4d-7197191e5b08" providerId="ADAL" clId="{8B587F43-1B51-4416-B410-57F8B9E236B1}" dt="2021-03-24T12:30:06.351" v="559" actId="5793"/>
-      <pc:docMkLst>
-        <pc:docMk/>
-      </pc:docMkLst>
-    </pc:docChg>
-  </pc:docChgLst>
-  <pc:docChgLst>
-    <pc:chgData name="Joseph Marvin R. Imperial" userId="c5118018-74d5-4421-be4d-7197191e5b08" providerId="ADAL" clId="{AB9EEC7B-5938-AB4A-BBF1-2D08914B856E}"/>
-    <pc:docChg chg="addSld delSld">
-      <pc:chgData name="Joseph Marvin R. Imperial" userId="c5118018-74d5-4421-be4d-7197191e5b08" providerId="ADAL" clId="{AB9EEC7B-5938-AB4A-BBF1-2D08914B856E}" dt="2021-04-20T00:57:02.237" v="3" actId="2696"/>
-      <pc:docMkLst>
-        <pc:docMk/>
-      </pc:docMkLst>
     </pc:docChg>
   </pc:docChgLst>
   <pc:docChgLst>
@@ -3186,7 +3192,7 @@
           <a:p>
             <a:fld id="{DCEEA480-FAED-44A7-B0CF-D7F3DF7642EB}" type="datetimeFigureOut">
               <a:rPr lang="en-PH" smtClean="0"/>
-              <a:t>26/05/2023</a:t>
+              <a:t>5/26/23</a:t>
             </a:fld>
             <a:endParaRPr lang="en-PH"/>
           </a:p>
@@ -3603,7 +3609,7 @@
           <a:p>
             <a:fld id="{E3F2C046-3488-4271-867B-6B64A28EF1DF}" type="datetimeFigureOut">
               <a:rPr lang="en-PH" smtClean="0"/>
-              <a:t>26/05/2023</a:t>
+              <a:t>5/26/23</a:t>
             </a:fld>
             <a:endParaRPr lang="en-PH"/>
           </a:p>
@@ -3803,7 +3809,7 @@
           <a:p>
             <a:fld id="{E3F2C046-3488-4271-867B-6B64A28EF1DF}" type="datetimeFigureOut">
               <a:rPr lang="en-PH" smtClean="0"/>
-              <a:t>26/05/2023</a:t>
+              <a:t>5/26/23</a:t>
             </a:fld>
             <a:endParaRPr lang="en-PH"/>
           </a:p>
@@ -4013,7 +4019,7 @@
           <a:p>
             <a:fld id="{E3F2C046-3488-4271-867B-6B64A28EF1DF}" type="datetimeFigureOut">
               <a:rPr lang="en-PH" smtClean="0"/>
-              <a:t>26/05/2023</a:t>
+              <a:t>5/26/23</a:t>
             </a:fld>
             <a:endParaRPr lang="en-PH"/>
           </a:p>
@@ -4273,7 +4279,7 @@
           <a:p>
             <a:fld id="{E3F2C046-3488-4271-867B-6B64A28EF1DF}" type="datetimeFigureOut">
               <a:rPr lang="en-PH" smtClean="0"/>
-              <a:t>26/05/2023</a:t>
+              <a:t>5/26/23</a:t>
             </a:fld>
             <a:endParaRPr lang="en-PH"/>
           </a:p>
@@ -4549,7 +4555,7 @@
           <a:p>
             <a:fld id="{E3F2C046-3488-4271-867B-6B64A28EF1DF}" type="datetimeFigureOut">
               <a:rPr lang="en-PH" smtClean="0"/>
-              <a:t>26/05/2023</a:t>
+              <a:t>5/26/23</a:t>
             </a:fld>
             <a:endParaRPr lang="en-PH"/>
           </a:p>
@@ -4817,7 +4823,7 @@
           <a:p>
             <a:fld id="{E3F2C046-3488-4271-867B-6B64A28EF1DF}" type="datetimeFigureOut">
               <a:rPr lang="en-PH" smtClean="0"/>
-              <a:t>26/05/2023</a:t>
+              <a:t>5/26/23</a:t>
             </a:fld>
             <a:endParaRPr lang="en-PH"/>
           </a:p>
@@ -5232,7 +5238,7 @@
           <a:p>
             <a:fld id="{E3F2C046-3488-4271-867B-6B64A28EF1DF}" type="datetimeFigureOut">
               <a:rPr lang="en-PH" smtClean="0"/>
-              <a:t>26/05/2023</a:t>
+              <a:t>5/26/23</a:t>
             </a:fld>
             <a:endParaRPr lang="en-PH"/>
           </a:p>
@@ -5374,7 +5380,7 @@
           <a:p>
             <a:fld id="{E3F2C046-3488-4271-867B-6B64A28EF1DF}" type="datetimeFigureOut">
               <a:rPr lang="en-PH" smtClean="0"/>
-              <a:t>26/05/2023</a:t>
+              <a:t>5/26/23</a:t>
             </a:fld>
             <a:endParaRPr lang="en-PH"/>
           </a:p>
@@ -5487,7 +5493,7 @@
           <a:p>
             <a:fld id="{E3F2C046-3488-4271-867B-6B64A28EF1DF}" type="datetimeFigureOut">
               <a:rPr lang="en-PH" smtClean="0"/>
-              <a:t>26/05/2023</a:t>
+              <a:t>5/26/23</a:t>
             </a:fld>
             <a:endParaRPr lang="en-PH"/>
           </a:p>
@@ -5800,7 +5806,7 @@
           <a:p>
             <a:fld id="{E3F2C046-3488-4271-867B-6B64A28EF1DF}" type="datetimeFigureOut">
               <a:rPr lang="en-PH" smtClean="0"/>
-              <a:t>26/05/2023</a:t>
+              <a:t>5/26/23</a:t>
             </a:fld>
             <a:endParaRPr lang="en-PH"/>
           </a:p>
@@ -6089,7 +6095,7 @@
           <a:p>
             <a:fld id="{E3F2C046-3488-4271-867B-6B64A28EF1DF}" type="datetimeFigureOut">
               <a:rPr lang="en-PH" smtClean="0"/>
-              <a:t>26/05/2023</a:t>
+              <a:t>5/26/23</a:t>
             </a:fld>
             <a:endParaRPr lang="en-PH"/>
           </a:p>
@@ -6332,7 +6338,7 @@
           <a:p>
             <a:fld id="{E3F2C046-3488-4271-867B-6B64A28EF1DF}" type="datetimeFigureOut">
               <a:rPr lang="en-PH" smtClean="0"/>
-              <a:t>26/05/2023</a:t>
+              <a:t>5/26/23</a:t>
             </a:fld>
             <a:endParaRPr lang="en-PH"/>
           </a:p>
@@ -7308,7 +7314,7 @@
         <p:spPr>
           <a:xfrm>
             <a:off x="2915382" y="1849692"/>
-            <a:ext cx="6224950" cy="461665"/>
+            <a:ext cx="6224950" cy="830997"/>
           </a:xfrm>
           <a:prstGeom prst="rect">
             <a:avLst/>
@@ -7323,20 +7329,14 @@
           <a:p>
             <a:pPr algn="ctr"/>
             <a:r>
-              <a:rPr lang="en-PH" sz="2400" b="1">
+              <a:rPr lang="en-PH" sz="2400" b="1" dirty="0">
                 <a:solidFill>
                   <a:schemeClr val="bg1"/>
                 </a:solidFill>
                 <a:latin typeface="Abadi" panose="020B0604020104020204" pitchFamily="34" charset="0"/>
               </a:rPr>
-              <a:t>Temporal-Difference Learning</a:t>
-            </a:r>
-            <a:endParaRPr lang="en-PH" sz="2400" b="1" dirty="0">
-              <a:solidFill>
-                <a:schemeClr val="bg1"/>
-              </a:solidFill>
-              <a:latin typeface="Abadi" panose="020B0604020104020204" pitchFamily="34" charset="0"/>
-            </a:endParaRPr>
+              <a:t>Model Free Prediction: Temporal-Difference Learning</a:t>
+            </a:r>
           </a:p>
         </p:txBody>
       </p:sp>
@@ -9558,8 +9558,8 @@
           </a:p>
         </p:txBody>
       </p:sp>
-      <mc:AlternateContent xmlns:mc="http://schemas.openxmlformats.org/markup-compatibility/2006">
-        <mc:Choice xmlns:a14="http://schemas.microsoft.com/office/drawing/2010/main" Requires="a14">
+      <mc:AlternateContent xmlns:mc="http://schemas.openxmlformats.org/markup-compatibility/2006" xmlns:a14="http://schemas.microsoft.com/office/drawing/2010/main">
+        <mc:Choice Requires="a14">
           <p:sp>
             <p:nvSpPr>
               <p:cNvPr id="2" name="TextBox 1">
@@ -9728,7 +9728,7 @@
             </p:txBody>
           </p:sp>
         </mc:Choice>
-        <mc:Fallback>
+        <mc:Fallback xmlns="">
           <p:sp>
             <p:nvSpPr>
               <p:cNvPr id="2" name="TextBox 1">
@@ -9833,8 +9833,8 @@
           </a:prstGeom>
         </p:spPr>
       </p:pic>
-      <mc:AlternateContent xmlns:mc="http://schemas.openxmlformats.org/markup-compatibility/2006">
-        <mc:Choice xmlns:a14="http://schemas.microsoft.com/office/drawing/2010/main" Requires="a14">
+      <mc:AlternateContent xmlns:mc="http://schemas.openxmlformats.org/markup-compatibility/2006" xmlns:a14="http://schemas.microsoft.com/office/drawing/2010/main">
+        <mc:Choice Requires="a14">
           <p:sp>
             <p:nvSpPr>
               <p:cNvPr id="10" name="TextBox 9">
@@ -9969,7 +9969,7 @@
             </p:txBody>
           </p:sp>
         </mc:Choice>
-        <mc:Fallback>
+        <mc:Fallback xmlns="">
           <p:sp>
             <p:nvSpPr>
               <p:cNvPr id="10" name="TextBox 9">
@@ -11026,8 +11026,8 @@
           </a:p>
         </p:txBody>
       </p:sp>
-      <mc:AlternateContent xmlns:mc="http://schemas.openxmlformats.org/markup-compatibility/2006">
-        <mc:Choice xmlns:a14="http://schemas.microsoft.com/office/drawing/2010/main" Requires="a14">
+      <mc:AlternateContent xmlns:mc="http://schemas.openxmlformats.org/markup-compatibility/2006" xmlns:a14="http://schemas.microsoft.com/office/drawing/2010/main">
+        <mc:Choice Requires="a14">
           <p:sp>
             <p:nvSpPr>
               <p:cNvPr id="10" name="TextBox 9">
@@ -11135,7 +11135,7 @@
             </p:txBody>
           </p:sp>
         </mc:Choice>
-        <mc:Fallback>
+        <mc:Fallback xmlns="">
           <p:sp>
             <p:nvSpPr>
               <p:cNvPr id="10" name="TextBox 9">
@@ -11555,17 +11555,17 @@
               <a:rPr lang="en-PH" b="1" dirty="0">
                 <a:latin typeface="+mn-lt"/>
               </a:rPr>
-              <a:t>Random Walk (TD vs. MC)</a:t>
+              <a:t>Dynamic Programming</a:t>
             </a:r>
           </a:p>
         </p:txBody>
       </p:sp>
       <p:pic>
         <p:nvPicPr>
-          <p:cNvPr id="2" name="Picture 1">
-            <a:extLst>
-              <a:ext uri="{FF2B5EF4-FFF2-40B4-BE49-F238E27FC236}">
-                <a16:creationId xmlns:a16="http://schemas.microsoft.com/office/drawing/2014/main" id="{C3EFDA7D-982D-4D44-9208-0D12C6AD1A51}"/>
+          <p:cNvPr id="3" name="Picture 2">
+            <a:extLst>
+              <a:ext uri="{FF2B5EF4-FFF2-40B4-BE49-F238E27FC236}">
+                <a16:creationId xmlns:a16="http://schemas.microsoft.com/office/drawing/2014/main" id="{9E62B824-FAF0-30CA-FBC7-F5E98740B7B8}"/>
               </a:ext>
             </a:extLst>
           </p:cNvPr>
@@ -11575,45 +11575,21 @@
           <p:nvPr/>
         </p:nvPicPr>
         <p:blipFill>
-          <a:blip r:embed="rId2"/>
+          <a:blip r:embed="rId2">
+            <a:extLst>
+              <a:ext uri="{28A0092B-C50C-407E-A947-70E740481C1C}">
+                <a14:useLocalDpi xmlns:a14="http://schemas.microsoft.com/office/drawing/2010/main" val="0"/>
+              </a:ext>
+            </a:extLst>
+          </a:blip>
           <a:stretch>
             <a:fillRect/>
           </a:stretch>
         </p:blipFill>
         <p:spPr>
           <a:xfrm>
-            <a:off x="1807209" y="1330153"/>
-            <a:ext cx="8343900" cy="1228725"/>
-          </a:xfrm>
-          <a:prstGeom prst="rect">
-            <a:avLst/>
-          </a:prstGeom>
-        </p:spPr>
-      </p:pic>
-      <p:pic>
-        <p:nvPicPr>
-          <p:cNvPr id="3" name="Picture 2">
-            <a:extLst>
-              <a:ext uri="{FF2B5EF4-FFF2-40B4-BE49-F238E27FC236}">
-                <a16:creationId xmlns:a16="http://schemas.microsoft.com/office/drawing/2014/main" id="{07C451A6-98C8-4461-BDD4-3FFFE1088715}"/>
-              </a:ext>
-            </a:extLst>
-          </p:cNvPr>
-          <p:cNvPicPr>
-            <a:picLocks noChangeAspect="1"/>
-          </p:cNvPicPr>
-          <p:nvPr/>
-        </p:nvPicPr>
-        <p:blipFill>
-          <a:blip r:embed="rId3"/>
-          <a:stretch>
-            <a:fillRect/>
-          </a:stretch>
-        </p:blipFill>
-        <p:spPr>
-          <a:xfrm>
-            <a:off x="1858486" y="2726980"/>
-            <a:ext cx="8241346" cy="3417499"/>
+            <a:off x="2863324" y="1337552"/>
+            <a:ext cx="6465352" cy="4430105"/>
           </a:xfrm>
           <a:prstGeom prst="rect">
             <a:avLst/>
@@ -11623,7 +11599,7 @@
     </p:spTree>
     <p:extLst>
       <p:ext uri="{BB962C8B-B14F-4D97-AF65-F5344CB8AC3E}">
-        <p14:creationId xmlns:p14="http://schemas.microsoft.com/office/powerpoint/2010/main" val="3307047475"/>
+        <p14:creationId xmlns:p14="http://schemas.microsoft.com/office/powerpoint/2010/main" val="1161498190"/>
       </p:ext>
     </p:extLst>
   </p:cSld>
@@ -11721,14 +11697,14 @@
           <a:p>
             <a:pPr algn="r"/>
             <a:r>
-              <a:rPr lang="en-US" sz="1600">
+              <a:rPr lang="en-US" sz="1600" dirty="0">
                 <a:solidFill>
                   <a:schemeClr val="bg1"/>
                 </a:solidFill>
               </a:rPr>
               <a:t>Course Code: CCINCOM/L</a:t>
             </a:r>
-            <a:endParaRPr lang="en-PH" sz="1600">
+            <a:endParaRPr lang="en-PH" sz="1600" dirty="0">
               <a:solidFill>
                 <a:schemeClr val="bg1"/>
               </a:solidFill>
@@ -11815,47 +11791,6 @@
                 <a:latin typeface="Abadi" panose="020B0604020202020204" pitchFamily="34" charset="0"/>
               </a:rPr>
               <a:t>NU College of Computing and Information Technologies</a:t>
-            </a:r>
-          </a:p>
-        </p:txBody>
-      </p:sp>
-      <p:sp>
-        <p:nvSpPr>
-          <p:cNvPr id="12" name="TextBox 11">
-            <a:extLst>
-              <a:ext uri="{FF2B5EF4-FFF2-40B4-BE49-F238E27FC236}">
-                <a16:creationId xmlns:a16="http://schemas.microsoft.com/office/drawing/2014/main" id="{3B95F0FF-3312-4F15-A3FC-1E4D0A0C4CA3}"/>
-              </a:ext>
-            </a:extLst>
-          </p:cNvPr>
-          <p:cNvSpPr txBox="1"/>
-          <p:nvPr/>
-        </p:nvSpPr>
-        <p:spPr>
-          <a:xfrm>
-            <a:off x="2915382" y="1849692"/>
-            <a:ext cx="6224950" cy="461665"/>
-          </a:xfrm>
-          <a:prstGeom prst="rect">
-            <a:avLst/>
-          </a:prstGeom>
-          <a:noFill/>
-        </p:spPr>
-        <p:txBody>
-          <a:bodyPr wrap="square" rtlCol="0">
-            <a:spAutoFit/>
-          </a:bodyPr>
-          <a:lstStyle/>
-          <a:p>
-            <a:pPr algn="ctr"/>
-            <a:r>
-              <a:rPr lang="en-PH" sz="2400" b="1">
-                <a:solidFill>
-                  <a:schemeClr val="bg1"/>
-                </a:solidFill>
-                <a:latin typeface="Abadi" panose="020B0604020104020204" pitchFamily="34" charset="0"/>
-              </a:rPr>
-              <a:t>Review in Probability, Intro to RL Concepts</a:t>
             </a:r>
           </a:p>
         </p:txBody>
@@ -12033,23 +11968,401 @@
           <a:lstStyle/>
           <a:p>
             <a:r>
-              <a:rPr lang="en-US" b="1" dirty="0">
+              <a:rPr lang="en-PH" b="1" dirty="0">
                 <a:latin typeface="+mn-lt"/>
               </a:rPr>
-              <a:t>References</a:t>
-            </a:r>
-            <a:endParaRPr lang="en-PH" b="1" dirty="0">
-              <a:latin typeface="+mn-lt"/>
+              <a:t>Monte-Carlo Backup</a:t>
+            </a:r>
+          </a:p>
+        </p:txBody>
+      </p:sp>
+      <p:pic>
+        <p:nvPicPr>
+          <p:cNvPr id="4" name="Picture 3">
+            <a:extLst>
+              <a:ext uri="{FF2B5EF4-FFF2-40B4-BE49-F238E27FC236}">
+                <a16:creationId xmlns:a16="http://schemas.microsoft.com/office/drawing/2014/main" id="{9EF157D2-BB50-E182-33BC-847560D60AA7}"/>
+              </a:ext>
+            </a:extLst>
+          </p:cNvPr>
+          <p:cNvPicPr>
+            <a:picLocks noChangeAspect="1"/>
+          </p:cNvPicPr>
+          <p:nvPr/>
+        </p:nvPicPr>
+        <p:blipFill>
+          <a:blip r:embed="rId2">
+            <a:extLst>
+              <a:ext uri="{28A0092B-C50C-407E-A947-70E740481C1C}">
+                <a14:useLocalDpi xmlns:a14="http://schemas.microsoft.com/office/drawing/2010/main" val="0"/>
+              </a:ext>
+            </a:extLst>
+          </a:blip>
+          <a:stretch>
+            <a:fillRect/>
+          </a:stretch>
+        </p:blipFill>
+        <p:spPr>
+          <a:xfrm>
+            <a:off x="2195512" y="1006997"/>
+            <a:ext cx="7772400" cy="5121278"/>
+          </a:xfrm>
+          <a:prstGeom prst="rect">
+            <a:avLst/>
+          </a:prstGeom>
+        </p:spPr>
+      </p:pic>
+    </p:spTree>
+    <p:extLst>
+      <p:ext uri="{BB962C8B-B14F-4D97-AF65-F5344CB8AC3E}">
+        <p14:creationId xmlns:p14="http://schemas.microsoft.com/office/powerpoint/2010/main" val="3189044618"/>
+      </p:ext>
+    </p:extLst>
+  </p:cSld>
+  <p:clrMapOvr>
+    <a:masterClrMapping/>
+  </p:clrMapOvr>
+</p:sld>
+</file>
+
+<file path=ppt/slides/slide16.xml><?xml version="1.0" encoding="utf-8"?>
+<p:sld xmlns:a="http://schemas.openxmlformats.org/drawingml/2006/main" xmlns:r="http://schemas.openxmlformats.org/officeDocument/2006/relationships" xmlns:p="http://schemas.openxmlformats.org/presentationml/2006/main">
+  <p:cSld>
+    <p:spTree>
+      <p:nvGrpSpPr>
+        <p:cNvPr id="1" name=""/>
+        <p:cNvGrpSpPr/>
+        <p:nvPr/>
+      </p:nvGrpSpPr>
+      <p:grpSpPr>
+        <a:xfrm>
+          <a:off x="0" y="0"/>
+          <a:ext cx="0" cy="0"/>
+          <a:chOff x="0" y="0"/>
+          <a:chExt cx="0" cy="0"/>
+        </a:xfrm>
+      </p:grpSpPr>
+      <p:sp>
+        <p:nvSpPr>
+          <p:cNvPr id="6" name="TextBox 5">
+            <a:extLst>
+              <a:ext uri="{FF2B5EF4-FFF2-40B4-BE49-F238E27FC236}">
+                <a16:creationId xmlns:a16="http://schemas.microsoft.com/office/drawing/2014/main" id="{933CA7EB-D821-4578-A186-D330E9178EDE}"/>
+              </a:ext>
+            </a:extLst>
+          </p:cNvPr>
+          <p:cNvSpPr txBox="1"/>
+          <p:nvPr/>
+        </p:nvSpPr>
+        <p:spPr>
+          <a:xfrm>
+            <a:off x="87923" y="28551"/>
+            <a:ext cx="3622432" cy="338554"/>
+          </a:xfrm>
+          <a:prstGeom prst="rect">
+            <a:avLst/>
+          </a:prstGeom>
+          <a:noFill/>
+        </p:spPr>
+        <p:txBody>
+          <a:bodyPr wrap="square" rtlCol="0">
+            <a:spAutoFit/>
+          </a:bodyPr>
+          <a:lstStyle/>
+          <a:p>
+            <a:r>
+              <a:rPr lang="en-PH" sz="1600">
+                <a:solidFill>
+                  <a:schemeClr val="bg1"/>
+                </a:solidFill>
+                <a:latin typeface="Abadi" panose="020B0604020104020204" pitchFamily="34" charset="0"/>
+                <a:cs typeface="Aharoni" panose="020B0604020202020204" pitchFamily="2" charset="-79"/>
+              </a:rPr>
+              <a:t>INTRODUCTION TO COMPUTING</a:t>
+            </a:r>
+          </a:p>
+        </p:txBody>
+      </p:sp>
+      <p:sp>
+        <p:nvSpPr>
+          <p:cNvPr id="7" name="TextBox 6">
+            <a:extLst>
+              <a:ext uri="{FF2B5EF4-FFF2-40B4-BE49-F238E27FC236}">
+                <a16:creationId xmlns:a16="http://schemas.microsoft.com/office/drawing/2014/main" id="{9B128FD4-EE77-4086-837E-5EAF83B0DDD1}"/>
+              </a:ext>
+            </a:extLst>
+          </p:cNvPr>
+          <p:cNvSpPr txBox="1"/>
+          <p:nvPr/>
+        </p:nvSpPr>
+        <p:spPr>
+          <a:xfrm>
+            <a:off x="9182099" y="13190"/>
+            <a:ext cx="2948354" cy="338554"/>
+          </a:xfrm>
+          <a:prstGeom prst="rect">
+            <a:avLst/>
+          </a:prstGeom>
+          <a:noFill/>
+        </p:spPr>
+        <p:txBody>
+          <a:bodyPr wrap="square" rtlCol="0">
+            <a:spAutoFit/>
+          </a:bodyPr>
+          <a:lstStyle/>
+          <a:p>
+            <a:pPr algn="r"/>
+            <a:r>
+              <a:rPr lang="en-US" sz="1600" dirty="0">
+                <a:solidFill>
+                  <a:schemeClr val="bg1"/>
+                </a:solidFill>
+              </a:rPr>
+              <a:t>Course Code: CCINCOM/L</a:t>
+            </a:r>
+            <a:endParaRPr lang="en-PH" sz="1600" dirty="0">
+              <a:solidFill>
+                <a:schemeClr val="bg1"/>
+              </a:solidFill>
+              <a:latin typeface="Abadi" panose="020B0604020202020204" pitchFamily="34" charset="0"/>
             </a:endParaRPr>
           </a:p>
         </p:txBody>
       </p:sp>
       <p:sp>
         <p:nvSpPr>
-          <p:cNvPr id="10" name="Content Placeholder 9">
-            <a:extLst>
-              <a:ext uri="{FF2B5EF4-FFF2-40B4-BE49-F238E27FC236}">
-                <a16:creationId xmlns:a16="http://schemas.microsoft.com/office/drawing/2014/main" id="{D5BBEC35-40CA-42D4-BC38-E13B39A6DA8E}"/>
+          <p:cNvPr id="8" name="TextBox 7">
+            <a:extLst>
+              <a:ext uri="{FF2B5EF4-FFF2-40B4-BE49-F238E27FC236}">
+                <a16:creationId xmlns:a16="http://schemas.microsoft.com/office/drawing/2014/main" id="{B95C7AD6-4918-4294-AA88-B72FB28833FE}"/>
+              </a:ext>
+            </a:extLst>
+          </p:cNvPr>
+          <p:cNvSpPr txBox="1"/>
+          <p:nvPr/>
+        </p:nvSpPr>
+        <p:spPr>
+          <a:xfrm>
+            <a:off x="0" y="6479929"/>
+            <a:ext cx="2461846" cy="338554"/>
+          </a:xfrm>
+          <a:prstGeom prst="rect">
+            <a:avLst/>
+          </a:prstGeom>
+          <a:noFill/>
+        </p:spPr>
+        <p:txBody>
+          <a:bodyPr wrap="square" rtlCol="0">
+            <a:spAutoFit/>
+          </a:bodyPr>
+          <a:lstStyle/>
+          <a:p>
+            <a:pPr algn="ctr"/>
+            <a:r>
+              <a:rPr lang="en-PH" sz="1600">
+                <a:solidFill>
+                  <a:schemeClr val="bg1"/>
+                </a:solidFill>
+                <a:latin typeface="Abadi" panose="020B0604020202020204" pitchFamily="34" charset="0"/>
+              </a:rPr>
+              <a:t>Joseph Marvin R. Imperial</a:t>
+            </a:r>
+          </a:p>
+        </p:txBody>
+      </p:sp>
+      <p:sp>
+        <p:nvSpPr>
+          <p:cNvPr id="9" name="TextBox 8">
+            <a:extLst>
+              <a:ext uri="{FF2B5EF4-FFF2-40B4-BE49-F238E27FC236}">
+                <a16:creationId xmlns:a16="http://schemas.microsoft.com/office/drawing/2014/main" id="{C3136E3D-4CFD-4EFC-98AB-367D0EF3C06B}"/>
+              </a:ext>
+            </a:extLst>
+          </p:cNvPr>
+          <p:cNvSpPr txBox="1"/>
+          <p:nvPr/>
+        </p:nvSpPr>
+        <p:spPr>
+          <a:xfrm>
+            <a:off x="7086601" y="6490896"/>
+            <a:ext cx="5105399" cy="338554"/>
+          </a:xfrm>
+          <a:prstGeom prst="rect">
+            <a:avLst/>
+          </a:prstGeom>
+          <a:noFill/>
+        </p:spPr>
+        <p:txBody>
+          <a:bodyPr wrap="square" rtlCol="0">
+            <a:spAutoFit/>
+          </a:bodyPr>
+          <a:lstStyle/>
+          <a:p>
+            <a:pPr algn="r"/>
+            <a:r>
+              <a:rPr lang="en-PH" sz="1600">
+                <a:solidFill>
+                  <a:schemeClr val="bg1"/>
+                </a:solidFill>
+                <a:latin typeface="Abadi" panose="020B0604020202020204" pitchFamily="34" charset="0"/>
+              </a:rPr>
+              <a:t>NU College of Computing and Information Technologies</a:t>
+            </a:r>
+          </a:p>
+        </p:txBody>
+      </p:sp>
+      <p:sp>
+        <p:nvSpPr>
+          <p:cNvPr id="13" name="Rectangle 12">
+            <a:extLst>
+              <a:ext uri="{FF2B5EF4-FFF2-40B4-BE49-F238E27FC236}">
+                <a16:creationId xmlns:a16="http://schemas.microsoft.com/office/drawing/2014/main" id="{251B30DC-ACC5-404F-B51D-13612F115E3E}"/>
+              </a:ext>
+            </a:extLst>
+          </p:cNvPr>
+          <p:cNvSpPr/>
+          <p:nvPr/>
+        </p:nvSpPr>
+        <p:spPr>
+          <a:xfrm>
+            <a:off x="0" y="6462346"/>
+            <a:ext cx="12192000" cy="395654"/>
+          </a:xfrm>
+          <a:prstGeom prst="rect">
+            <a:avLst/>
+          </a:prstGeom>
+          <a:solidFill>
+            <a:schemeClr val="accent5">
+              <a:lumMod val="50000"/>
+            </a:schemeClr>
+          </a:solidFill>
+          <a:effectLst>
+            <a:outerShdw blurRad="50800" dist="38100" dir="2700000" algn="tl" rotWithShape="0">
+              <a:prstClr val="black">
+                <a:alpha val="40000"/>
+              </a:prstClr>
+            </a:outerShdw>
+          </a:effectLst>
+        </p:spPr>
+        <p:style>
+          <a:lnRef idx="2">
+            <a:schemeClr val="accent1">
+              <a:shade val="50000"/>
+            </a:schemeClr>
+          </a:lnRef>
+          <a:fillRef idx="1">
+            <a:schemeClr val="accent1"/>
+          </a:fillRef>
+          <a:effectRef idx="0">
+            <a:schemeClr val="accent1"/>
+          </a:effectRef>
+          <a:fontRef idx="minor">
+            <a:schemeClr val="lt1"/>
+          </a:fontRef>
+        </p:style>
+        <p:txBody>
+          <a:bodyPr rtlCol="0" anchor="ctr"/>
+          <a:lstStyle/>
+          <a:p>
+            <a:pPr algn="ctr"/>
+            <a:endParaRPr lang="en-PH"/>
+          </a:p>
+        </p:txBody>
+      </p:sp>
+      <p:sp>
+        <p:nvSpPr>
+          <p:cNvPr id="14" name="TextBox 13">
+            <a:extLst>
+              <a:ext uri="{FF2B5EF4-FFF2-40B4-BE49-F238E27FC236}">
+                <a16:creationId xmlns:a16="http://schemas.microsoft.com/office/drawing/2014/main" id="{ACC57CA2-30CA-4DDD-A941-8B9CC393DAFA}"/>
+              </a:ext>
+            </a:extLst>
+          </p:cNvPr>
+          <p:cNvSpPr txBox="1"/>
+          <p:nvPr/>
+        </p:nvSpPr>
+        <p:spPr>
+          <a:xfrm>
+            <a:off x="0" y="6490896"/>
+            <a:ext cx="3622432" cy="338554"/>
+          </a:xfrm>
+          <a:prstGeom prst="rect">
+            <a:avLst/>
+          </a:prstGeom>
+          <a:noFill/>
+        </p:spPr>
+        <p:txBody>
+          <a:bodyPr wrap="square" rtlCol="0">
+            <a:spAutoFit/>
+          </a:bodyPr>
+          <a:lstStyle/>
+          <a:p>
+            <a:r>
+              <a:rPr lang="en-PH" sz="1600">
+                <a:solidFill>
+                  <a:schemeClr val="bg1"/>
+                </a:solidFill>
+                <a:latin typeface="Abadi" panose="020B0604020104020204" pitchFamily="34" charset="0"/>
+                <a:cs typeface="Aharoni" panose="020B0604020202020204" pitchFamily="2" charset="-79"/>
+              </a:rPr>
+              <a:t>REINFORCEMENT LEARNING</a:t>
+            </a:r>
+          </a:p>
+        </p:txBody>
+      </p:sp>
+      <p:sp>
+        <p:nvSpPr>
+          <p:cNvPr id="15" name="TextBox 14">
+            <a:extLst>
+              <a:ext uri="{FF2B5EF4-FFF2-40B4-BE49-F238E27FC236}">
+                <a16:creationId xmlns:a16="http://schemas.microsoft.com/office/drawing/2014/main" id="{31237222-F604-49F1-8989-AF06AF20EDD3}"/>
+              </a:ext>
+            </a:extLst>
+          </p:cNvPr>
+          <p:cNvSpPr txBox="1"/>
+          <p:nvPr/>
+        </p:nvSpPr>
+        <p:spPr>
+          <a:xfrm>
+            <a:off x="9243646" y="6490896"/>
+            <a:ext cx="2948354" cy="338554"/>
+          </a:xfrm>
+          <a:prstGeom prst="rect">
+            <a:avLst/>
+          </a:prstGeom>
+          <a:noFill/>
+        </p:spPr>
+        <p:txBody>
+          <a:bodyPr wrap="square" rtlCol="0">
+            <a:spAutoFit/>
+          </a:bodyPr>
+          <a:lstStyle/>
+          <a:p>
+            <a:pPr algn="r"/>
+            <a:r>
+              <a:rPr lang="en-US" sz="1600">
+                <a:solidFill>
+                  <a:schemeClr val="bg1"/>
+                </a:solidFill>
+                <a:latin typeface="Abadi" panose="020B0604020104020204" pitchFamily="34" charset="0"/>
+              </a:rPr>
+              <a:t>Course Code: CCRNFLRL</a:t>
+            </a:r>
+            <a:endParaRPr lang="en-PH" sz="1600">
+              <a:solidFill>
+                <a:schemeClr val="bg1"/>
+              </a:solidFill>
+              <a:latin typeface="Abadi" panose="020B0604020104020204" pitchFamily="34" charset="0"/>
+            </a:endParaRPr>
+          </a:p>
+        </p:txBody>
+      </p:sp>
+      <p:sp>
+        <p:nvSpPr>
+          <p:cNvPr id="5" name="Title 4">
+            <a:extLst>
+              <a:ext uri="{FF2B5EF4-FFF2-40B4-BE49-F238E27FC236}">
+                <a16:creationId xmlns:a16="http://schemas.microsoft.com/office/drawing/2014/main" id="{EC47D021-EEC4-42AC-B4C3-BC584CB5BC9D}"/>
               </a:ext>
             </a:extLst>
           </p:cNvPr>
@@ -12057,84 +12370,1485 @@
             <a:spLocks noGrp="1"/>
           </p:cNvSpPr>
           <p:nvPr>
-            <p:ph idx="1"/>
+            <p:ph type="title"/>
           </p:nvPr>
         </p:nvSpPr>
         <p:spPr>
           <a:xfrm>
-            <a:off x="380999" y="1352550"/>
-            <a:ext cx="11343641" cy="4905375"/>
-          </a:xfrm>
-        </p:spPr>
-        <p:txBody>
-          <a:bodyPr>
-            <a:normAutofit/>
-          </a:bodyPr>
-          <a:lstStyle/>
-          <a:p>
-            <a:pPr marL="457200" indent="-457200">
-              <a:buFont typeface="+mj-lt"/>
-              <a:buAutoNum type="arabicPeriod"/>
-            </a:pPr>
-            <a:r>
-              <a:rPr lang="en-US" sz="2000" dirty="0"/>
-              <a:t>Images are licensed with Creative Commons. Can use without citing.</a:t>
-            </a:r>
-          </a:p>
-          <a:p>
-            <a:pPr marL="457200" indent="-457200">
-              <a:buFont typeface="+mj-lt"/>
-              <a:buAutoNum type="arabicPeriod"/>
-            </a:pPr>
-            <a:r>
-              <a:rPr lang="en-US" sz="2000" dirty="0"/>
-              <a:t>Prof. Emma </a:t>
-            </a:r>
-            <a:r>
-              <a:rPr lang="en-US" sz="2000" dirty="0" err="1"/>
-              <a:t>Brunskill’s</a:t>
-            </a:r>
-            <a:r>
-              <a:rPr lang="en-US" sz="2000" dirty="0"/>
-              <a:t> slides (CS234RL). </a:t>
-            </a:r>
-            <a:r>
-              <a:rPr lang="en-US" sz="2000" dirty="0">
-                <a:hlinkClick r:id="rId2"/>
+            <a:off x="352425" y="292273"/>
+            <a:ext cx="11458574" cy="869778"/>
+          </a:xfrm>
+        </p:spPr>
+        <p:txBody>
+          <a:bodyPr/>
+          <a:lstStyle/>
+          <a:p>
+            <a:r>
+              <a:rPr lang="en-PH" b="1" dirty="0">
+                <a:latin typeface="+mn-lt"/>
               </a:rPr>
-              <a:t>https://web.stanford.edu/class/cs234/slides/lecture1.pdf</a:t>
-            </a:r>
-            <a:endParaRPr lang="en-US" sz="2000" dirty="0"/>
-          </a:p>
-          <a:p>
-            <a:pPr marL="457200" indent="-457200">
-              <a:buFont typeface="+mj-lt"/>
-              <a:buAutoNum type="arabicPeriod"/>
-            </a:pPr>
-            <a:r>
-              <a:rPr lang="en-US" sz="2000" dirty="0"/>
-              <a:t>David Silver’s slides. </a:t>
-            </a:r>
-            <a:r>
-              <a:rPr lang="en-US" sz="2000" dirty="0">
-                <a:hlinkClick r:id="rId3"/>
-              </a:rPr>
-              <a:t>https://www.davidsilver.uk/wp-content/uploads/2020/03/intro_RL.pdf</a:t>
-            </a:r>
-            <a:endParaRPr lang="en-US" sz="2000" dirty="0"/>
-          </a:p>
-          <a:p>
-            <a:pPr marL="0" indent="0">
-              <a:buNone/>
-            </a:pPr>
-            <a:endParaRPr lang="en-US" sz="2000" dirty="0"/>
-          </a:p>
-        </p:txBody>
-      </p:sp>
+              <a:t>Temporal Difference Backup</a:t>
+            </a:r>
+          </a:p>
+        </p:txBody>
+      </p:sp>
+      <p:pic>
+        <p:nvPicPr>
+          <p:cNvPr id="4" name="Picture 3">
+            <a:extLst>
+              <a:ext uri="{FF2B5EF4-FFF2-40B4-BE49-F238E27FC236}">
+                <a16:creationId xmlns:a16="http://schemas.microsoft.com/office/drawing/2014/main" id="{E21AA8FF-0601-4936-FE21-394165DF8A81}"/>
+              </a:ext>
+            </a:extLst>
+          </p:cNvPr>
+          <p:cNvPicPr>
+            <a:picLocks noChangeAspect="1"/>
+          </p:cNvPicPr>
+          <p:nvPr/>
+        </p:nvPicPr>
+        <p:blipFill>
+          <a:blip r:embed="rId2">
+            <a:extLst>
+              <a:ext uri="{28A0092B-C50C-407E-A947-70E740481C1C}">
+                <a14:useLocalDpi xmlns:a14="http://schemas.microsoft.com/office/drawing/2010/main" val="0"/>
+              </a:ext>
+            </a:extLst>
+          </a:blip>
+          <a:stretch>
+            <a:fillRect/>
+          </a:stretch>
+        </p:blipFill>
+        <p:spPr>
+          <a:xfrm>
+            <a:off x="2195512" y="1162051"/>
+            <a:ext cx="7772400" cy="4986228"/>
+          </a:xfrm>
+          <a:prstGeom prst="rect">
+            <a:avLst/>
+          </a:prstGeom>
+        </p:spPr>
+      </p:pic>
     </p:spTree>
     <p:extLst>
       <p:ext uri="{BB962C8B-B14F-4D97-AF65-F5344CB8AC3E}">
-        <p14:creationId xmlns:p14="http://schemas.microsoft.com/office/powerpoint/2010/main" val="31654266"/>
+        <p14:creationId xmlns:p14="http://schemas.microsoft.com/office/powerpoint/2010/main" val="3677392528"/>
+      </p:ext>
+    </p:extLst>
+  </p:cSld>
+  <p:clrMapOvr>
+    <a:masterClrMapping/>
+  </p:clrMapOvr>
+</p:sld>
+</file>
+
+<file path=ppt/slides/slide17.xml><?xml version="1.0" encoding="utf-8"?>
+<p:sld xmlns:a="http://schemas.openxmlformats.org/drawingml/2006/main" xmlns:r="http://schemas.openxmlformats.org/officeDocument/2006/relationships" xmlns:p="http://schemas.openxmlformats.org/presentationml/2006/main">
+  <p:cSld>
+    <p:spTree>
+      <p:nvGrpSpPr>
+        <p:cNvPr id="1" name=""/>
+        <p:cNvGrpSpPr/>
+        <p:nvPr/>
+      </p:nvGrpSpPr>
+      <p:grpSpPr>
+        <a:xfrm>
+          <a:off x="0" y="0"/>
+          <a:ext cx="0" cy="0"/>
+          <a:chOff x="0" y="0"/>
+          <a:chExt cx="0" cy="0"/>
+        </a:xfrm>
+      </p:grpSpPr>
+      <p:sp>
+        <p:nvSpPr>
+          <p:cNvPr id="6" name="TextBox 5">
+            <a:extLst>
+              <a:ext uri="{FF2B5EF4-FFF2-40B4-BE49-F238E27FC236}">
+                <a16:creationId xmlns:a16="http://schemas.microsoft.com/office/drawing/2014/main" id="{933CA7EB-D821-4578-A186-D330E9178EDE}"/>
+              </a:ext>
+            </a:extLst>
+          </p:cNvPr>
+          <p:cNvSpPr txBox="1"/>
+          <p:nvPr/>
+        </p:nvSpPr>
+        <p:spPr>
+          <a:xfrm>
+            <a:off x="87923" y="28551"/>
+            <a:ext cx="3622432" cy="338554"/>
+          </a:xfrm>
+          <a:prstGeom prst="rect">
+            <a:avLst/>
+          </a:prstGeom>
+          <a:noFill/>
+        </p:spPr>
+        <p:txBody>
+          <a:bodyPr wrap="square" rtlCol="0">
+            <a:spAutoFit/>
+          </a:bodyPr>
+          <a:lstStyle/>
+          <a:p>
+            <a:r>
+              <a:rPr lang="en-PH" sz="1600">
+                <a:solidFill>
+                  <a:schemeClr val="bg1"/>
+                </a:solidFill>
+                <a:latin typeface="Abadi" panose="020B0604020104020204" pitchFamily="34" charset="0"/>
+                <a:cs typeface="Aharoni" panose="020B0604020202020204" pitchFamily="2" charset="-79"/>
+              </a:rPr>
+              <a:t>INTRODUCTION TO COMPUTING</a:t>
+            </a:r>
+          </a:p>
+        </p:txBody>
+      </p:sp>
+      <p:sp>
+        <p:nvSpPr>
+          <p:cNvPr id="7" name="TextBox 6">
+            <a:extLst>
+              <a:ext uri="{FF2B5EF4-FFF2-40B4-BE49-F238E27FC236}">
+                <a16:creationId xmlns:a16="http://schemas.microsoft.com/office/drawing/2014/main" id="{9B128FD4-EE77-4086-837E-5EAF83B0DDD1}"/>
+              </a:ext>
+            </a:extLst>
+          </p:cNvPr>
+          <p:cNvSpPr txBox="1"/>
+          <p:nvPr/>
+        </p:nvSpPr>
+        <p:spPr>
+          <a:xfrm>
+            <a:off x="9182099" y="13190"/>
+            <a:ext cx="2948354" cy="338554"/>
+          </a:xfrm>
+          <a:prstGeom prst="rect">
+            <a:avLst/>
+          </a:prstGeom>
+          <a:noFill/>
+        </p:spPr>
+        <p:txBody>
+          <a:bodyPr wrap="square" rtlCol="0">
+            <a:spAutoFit/>
+          </a:bodyPr>
+          <a:lstStyle/>
+          <a:p>
+            <a:pPr algn="r"/>
+            <a:r>
+              <a:rPr lang="en-US" sz="1600" dirty="0">
+                <a:solidFill>
+                  <a:schemeClr val="bg1"/>
+                </a:solidFill>
+              </a:rPr>
+              <a:t>Course Code: CCINCOM/L</a:t>
+            </a:r>
+            <a:endParaRPr lang="en-PH" sz="1600" dirty="0">
+              <a:solidFill>
+                <a:schemeClr val="bg1"/>
+              </a:solidFill>
+              <a:latin typeface="Abadi" panose="020B0604020202020204" pitchFamily="34" charset="0"/>
+            </a:endParaRPr>
+          </a:p>
+        </p:txBody>
+      </p:sp>
+      <p:sp>
+        <p:nvSpPr>
+          <p:cNvPr id="8" name="TextBox 7">
+            <a:extLst>
+              <a:ext uri="{FF2B5EF4-FFF2-40B4-BE49-F238E27FC236}">
+                <a16:creationId xmlns:a16="http://schemas.microsoft.com/office/drawing/2014/main" id="{B95C7AD6-4918-4294-AA88-B72FB28833FE}"/>
+              </a:ext>
+            </a:extLst>
+          </p:cNvPr>
+          <p:cNvSpPr txBox="1"/>
+          <p:nvPr/>
+        </p:nvSpPr>
+        <p:spPr>
+          <a:xfrm>
+            <a:off x="0" y="6479929"/>
+            <a:ext cx="2461846" cy="338554"/>
+          </a:xfrm>
+          <a:prstGeom prst="rect">
+            <a:avLst/>
+          </a:prstGeom>
+          <a:noFill/>
+        </p:spPr>
+        <p:txBody>
+          <a:bodyPr wrap="square" rtlCol="0">
+            <a:spAutoFit/>
+          </a:bodyPr>
+          <a:lstStyle/>
+          <a:p>
+            <a:pPr algn="ctr"/>
+            <a:r>
+              <a:rPr lang="en-PH" sz="1600">
+                <a:solidFill>
+                  <a:schemeClr val="bg1"/>
+                </a:solidFill>
+                <a:latin typeface="Abadi" panose="020B0604020202020204" pitchFamily="34" charset="0"/>
+              </a:rPr>
+              <a:t>Joseph Marvin R. Imperial</a:t>
+            </a:r>
+          </a:p>
+        </p:txBody>
+      </p:sp>
+      <p:sp>
+        <p:nvSpPr>
+          <p:cNvPr id="9" name="TextBox 8">
+            <a:extLst>
+              <a:ext uri="{FF2B5EF4-FFF2-40B4-BE49-F238E27FC236}">
+                <a16:creationId xmlns:a16="http://schemas.microsoft.com/office/drawing/2014/main" id="{C3136E3D-4CFD-4EFC-98AB-367D0EF3C06B}"/>
+              </a:ext>
+            </a:extLst>
+          </p:cNvPr>
+          <p:cNvSpPr txBox="1"/>
+          <p:nvPr/>
+        </p:nvSpPr>
+        <p:spPr>
+          <a:xfrm>
+            <a:off x="7086601" y="6490896"/>
+            <a:ext cx="5105399" cy="338554"/>
+          </a:xfrm>
+          <a:prstGeom prst="rect">
+            <a:avLst/>
+          </a:prstGeom>
+          <a:noFill/>
+        </p:spPr>
+        <p:txBody>
+          <a:bodyPr wrap="square" rtlCol="0">
+            <a:spAutoFit/>
+          </a:bodyPr>
+          <a:lstStyle/>
+          <a:p>
+            <a:pPr algn="r"/>
+            <a:r>
+              <a:rPr lang="en-PH" sz="1600">
+                <a:solidFill>
+                  <a:schemeClr val="bg1"/>
+                </a:solidFill>
+                <a:latin typeface="Abadi" panose="020B0604020202020204" pitchFamily="34" charset="0"/>
+              </a:rPr>
+              <a:t>NU College of Computing and Information Technologies</a:t>
+            </a:r>
+          </a:p>
+        </p:txBody>
+      </p:sp>
+      <p:sp>
+        <p:nvSpPr>
+          <p:cNvPr id="13" name="Rectangle 12">
+            <a:extLst>
+              <a:ext uri="{FF2B5EF4-FFF2-40B4-BE49-F238E27FC236}">
+                <a16:creationId xmlns:a16="http://schemas.microsoft.com/office/drawing/2014/main" id="{251B30DC-ACC5-404F-B51D-13612F115E3E}"/>
+              </a:ext>
+            </a:extLst>
+          </p:cNvPr>
+          <p:cNvSpPr/>
+          <p:nvPr/>
+        </p:nvSpPr>
+        <p:spPr>
+          <a:xfrm>
+            <a:off x="0" y="6462346"/>
+            <a:ext cx="12192000" cy="395654"/>
+          </a:xfrm>
+          <a:prstGeom prst="rect">
+            <a:avLst/>
+          </a:prstGeom>
+          <a:solidFill>
+            <a:schemeClr val="accent5">
+              <a:lumMod val="50000"/>
+            </a:schemeClr>
+          </a:solidFill>
+          <a:effectLst>
+            <a:outerShdw blurRad="50800" dist="38100" dir="2700000" algn="tl" rotWithShape="0">
+              <a:prstClr val="black">
+                <a:alpha val="40000"/>
+              </a:prstClr>
+            </a:outerShdw>
+          </a:effectLst>
+        </p:spPr>
+        <p:style>
+          <a:lnRef idx="2">
+            <a:schemeClr val="accent1">
+              <a:shade val="50000"/>
+            </a:schemeClr>
+          </a:lnRef>
+          <a:fillRef idx="1">
+            <a:schemeClr val="accent1"/>
+          </a:fillRef>
+          <a:effectRef idx="0">
+            <a:schemeClr val="accent1"/>
+          </a:effectRef>
+          <a:fontRef idx="minor">
+            <a:schemeClr val="lt1"/>
+          </a:fontRef>
+        </p:style>
+        <p:txBody>
+          <a:bodyPr rtlCol="0" anchor="ctr"/>
+          <a:lstStyle/>
+          <a:p>
+            <a:pPr algn="ctr"/>
+            <a:endParaRPr lang="en-PH"/>
+          </a:p>
+        </p:txBody>
+      </p:sp>
+      <p:sp>
+        <p:nvSpPr>
+          <p:cNvPr id="14" name="TextBox 13">
+            <a:extLst>
+              <a:ext uri="{FF2B5EF4-FFF2-40B4-BE49-F238E27FC236}">
+                <a16:creationId xmlns:a16="http://schemas.microsoft.com/office/drawing/2014/main" id="{ACC57CA2-30CA-4DDD-A941-8B9CC393DAFA}"/>
+              </a:ext>
+            </a:extLst>
+          </p:cNvPr>
+          <p:cNvSpPr txBox="1"/>
+          <p:nvPr/>
+        </p:nvSpPr>
+        <p:spPr>
+          <a:xfrm>
+            <a:off x="0" y="6490896"/>
+            <a:ext cx="3622432" cy="338554"/>
+          </a:xfrm>
+          <a:prstGeom prst="rect">
+            <a:avLst/>
+          </a:prstGeom>
+          <a:noFill/>
+        </p:spPr>
+        <p:txBody>
+          <a:bodyPr wrap="square" rtlCol="0">
+            <a:spAutoFit/>
+          </a:bodyPr>
+          <a:lstStyle/>
+          <a:p>
+            <a:r>
+              <a:rPr lang="en-PH" sz="1600">
+                <a:solidFill>
+                  <a:schemeClr val="bg1"/>
+                </a:solidFill>
+                <a:latin typeface="Abadi" panose="020B0604020104020204" pitchFamily="34" charset="0"/>
+                <a:cs typeface="Aharoni" panose="020B0604020202020204" pitchFamily="2" charset="-79"/>
+              </a:rPr>
+              <a:t>REINFORCEMENT LEARNING</a:t>
+            </a:r>
+          </a:p>
+        </p:txBody>
+      </p:sp>
+      <p:sp>
+        <p:nvSpPr>
+          <p:cNvPr id="15" name="TextBox 14">
+            <a:extLst>
+              <a:ext uri="{FF2B5EF4-FFF2-40B4-BE49-F238E27FC236}">
+                <a16:creationId xmlns:a16="http://schemas.microsoft.com/office/drawing/2014/main" id="{31237222-F604-49F1-8989-AF06AF20EDD3}"/>
+              </a:ext>
+            </a:extLst>
+          </p:cNvPr>
+          <p:cNvSpPr txBox="1"/>
+          <p:nvPr/>
+        </p:nvSpPr>
+        <p:spPr>
+          <a:xfrm>
+            <a:off x="9243646" y="6490896"/>
+            <a:ext cx="2948354" cy="338554"/>
+          </a:xfrm>
+          <a:prstGeom prst="rect">
+            <a:avLst/>
+          </a:prstGeom>
+          <a:noFill/>
+        </p:spPr>
+        <p:txBody>
+          <a:bodyPr wrap="square" rtlCol="0">
+            <a:spAutoFit/>
+          </a:bodyPr>
+          <a:lstStyle/>
+          <a:p>
+            <a:pPr algn="r"/>
+            <a:r>
+              <a:rPr lang="en-US" sz="1600">
+                <a:solidFill>
+                  <a:schemeClr val="bg1"/>
+                </a:solidFill>
+                <a:latin typeface="Abadi" panose="020B0604020104020204" pitchFamily="34" charset="0"/>
+              </a:rPr>
+              <a:t>Course Code: CCRNFLRL</a:t>
+            </a:r>
+            <a:endParaRPr lang="en-PH" sz="1600">
+              <a:solidFill>
+                <a:schemeClr val="bg1"/>
+              </a:solidFill>
+              <a:latin typeface="Abadi" panose="020B0604020104020204" pitchFamily="34" charset="0"/>
+            </a:endParaRPr>
+          </a:p>
+        </p:txBody>
+      </p:sp>
+      <p:sp>
+        <p:nvSpPr>
+          <p:cNvPr id="5" name="Title 4">
+            <a:extLst>
+              <a:ext uri="{FF2B5EF4-FFF2-40B4-BE49-F238E27FC236}">
+                <a16:creationId xmlns:a16="http://schemas.microsoft.com/office/drawing/2014/main" id="{EC47D021-EEC4-42AC-B4C3-BC584CB5BC9D}"/>
+              </a:ext>
+            </a:extLst>
+          </p:cNvPr>
+          <p:cNvSpPr>
+            <a:spLocks noGrp="1"/>
+          </p:cNvSpPr>
+          <p:nvPr>
+            <p:ph type="title"/>
+          </p:nvPr>
+        </p:nvSpPr>
+        <p:spPr>
+          <a:xfrm>
+            <a:off x="352425" y="292273"/>
+            <a:ext cx="11458574" cy="869778"/>
+          </a:xfrm>
+        </p:spPr>
+        <p:txBody>
+          <a:bodyPr/>
+          <a:lstStyle/>
+          <a:p>
+            <a:r>
+              <a:rPr lang="en-PH" b="1" dirty="0">
+                <a:latin typeface="+mn-lt"/>
+              </a:rPr>
+              <a:t>Bootstrapping and Sampling</a:t>
+            </a:r>
+          </a:p>
+        </p:txBody>
+      </p:sp>
+      <p:sp>
+        <p:nvSpPr>
+          <p:cNvPr id="4" name="TextBox 3">
+            <a:extLst>
+              <a:ext uri="{FF2B5EF4-FFF2-40B4-BE49-F238E27FC236}">
+                <a16:creationId xmlns:a16="http://schemas.microsoft.com/office/drawing/2014/main" id="{DC942B3B-17B6-C02A-21CC-8B17B06224B7}"/>
+              </a:ext>
+            </a:extLst>
+          </p:cNvPr>
+          <p:cNvSpPr txBox="1"/>
+          <p:nvPr/>
+        </p:nvSpPr>
+        <p:spPr>
+          <a:xfrm>
+            <a:off x="520861" y="1441134"/>
+            <a:ext cx="4626523" cy="1200329"/>
+          </a:xfrm>
+          <a:prstGeom prst="rect">
+            <a:avLst/>
+          </a:prstGeom>
+          <a:noFill/>
+        </p:spPr>
+        <p:txBody>
+          <a:bodyPr wrap="none" rtlCol="0">
+            <a:spAutoFit/>
+          </a:bodyPr>
+          <a:lstStyle/>
+          <a:p>
+            <a:pPr marL="285750" indent="-285750">
+              <a:buFont typeface="Wingdings" pitchFamily="2" charset="2"/>
+              <a:buChar char="§"/>
+            </a:pPr>
+            <a:r>
+              <a:rPr lang="en-US" b="1" dirty="0">
+                <a:solidFill>
+                  <a:srgbClr val="0070C0"/>
+                </a:solidFill>
+              </a:rPr>
+              <a:t>Bootstrapping</a:t>
+            </a:r>
+            <a:r>
+              <a:rPr lang="en-US" dirty="0"/>
+              <a:t>: updates involves an estimate</a:t>
+            </a:r>
+          </a:p>
+          <a:p>
+            <a:pPr marL="742950" lvl="1" indent="-285750">
+              <a:buFont typeface="Wingdings" pitchFamily="2" charset="2"/>
+              <a:buChar char="§"/>
+            </a:pPr>
+            <a:r>
+              <a:rPr lang="en-US" dirty="0"/>
+              <a:t>MC does not bootstrap</a:t>
+            </a:r>
+          </a:p>
+          <a:p>
+            <a:pPr marL="742950" lvl="1" indent="-285750">
+              <a:buFont typeface="Wingdings" pitchFamily="2" charset="2"/>
+              <a:buChar char="§"/>
+            </a:pPr>
+            <a:r>
+              <a:rPr lang="en-US" dirty="0"/>
+              <a:t>DP bootstraps</a:t>
+            </a:r>
+          </a:p>
+          <a:p>
+            <a:pPr marL="742950" lvl="1" indent="-285750">
+              <a:buFont typeface="Wingdings" pitchFamily="2" charset="2"/>
+              <a:buChar char="§"/>
+            </a:pPr>
+            <a:r>
+              <a:rPr lang="en-US" dirty="0"/>
+              <a:t>TD bootstraps</a:t>
+            </a:r>
+          </a:p>
+        </p:txBody>
+      </p:sp>
+      <p:sp>
+        <p:nvSpPr>
+          <p:cNvPr id="11" name="TextBox 10">
+            <a:extLst>
+              <a:ext uri="{FF2B5EF4-FFF2-40B4-BE49-F238E27FC236}">
+                <a16:creationId xmlns:a16="http://schemas.microsoft.com/office/drawing/2014/main" id="{BD7E4D0B-3E42-AE2F-D5BF-6042471EF122}"/>
+              </a:ext>
+            </a:extLst>
+          </p:cNvPr>
+          <p:cNvSpPr txBox="1"/>
+          <p:nvPr/>
+        </p:nvSpPr>
+        <p:spPr>
+          <a:xfrm>
+            <a:off x="520860" y="3062376"/>
+            <a:ext cx="4449873" cy="2308324"/>
+          </a:xfrm>
+          <a:prstGeom prst="rect">
+            <a:avLst/>
+          </a:prstGeom>
+          <a:noFill/>
+        </p:spPr>
+        <p:txBody>
+          <a:bodyPr wrap="none" rtlCol="0">
+            <a:spAutoFit/>
+          </a:bodyPr>
+          <a:lstStyle/>
+          <a:p>
+            <a:pPr marL="285750" indent="-285750">
+              <a:buFont typeface="Wingdings" pitchFamily="2" charset="2"/>
+              <a:buChar char="§"/>
+            </a:pPr>
+            <a:r>
+              <a:rPr lang="en-US" b="1" dirty="0">
+                <a:solidFill>
+                  <a:srgbClr val="0070C0"/>
+                </a:solidFill>
+              </a:rPr>
+              <a:t>Sampling</a:t>
+            </a:r>
+            <a:r>
+              <a:rPr lang="en-US" dirty="0"/>
+              <a:t>: updates involves an expectation</a:t>
+            </a:r>
+          </a:p>
+          <a:p>
+            <a:pPr marL="742950" lvl="1" indent="-285750">
+              <a:buFont typeface="Wingdings" pitchFamily="2" charset="2"/>
+              <a:buChar char="§"/>
+            </a:pPr>
+            <a:r>
+              <a:rPr lang="en-US" dirty="0"/>
+              <a:t>MC samples</a:t>
+            </a:r>
+          </a:p>
+          <a:p>
+            <a:pPr marL="742950" lvl="1" indent="-285750">
+              <a:buFont typeface="Wingdings" pitchFamily="2" charset="2"/>
+              <a:buChar char="§"/>
+            </a:pPr>
+            <a:r>
+              <a:rPr lang="en-US" dirty="0"/>
+              <a:t>DP does not sample</a:t>
+            </a:r>
+          </a:p>
+          <a:p>
+            <a:pPr marL="742950" lvl="1" indent="-285750">
+              <a:buFont typeface="Wingdings" pitchFamily="2" charset="2"/>
+              <a:buChar char="§"/>
+            </a:pPr>
+            <a:r>
+              <a:rPr lang="en-US" dirty="0"/>
+              <a:t>TD samples</a:t>
+            </a:r>
+          </a:p>
+          <a:p>
+            <a:pPr marL="742950" lvl="1" indent="-285750">
+              <a:buFont typeface="Wingdings" pitchFamily="2" charset="2"/>
+              <a:buChar char="§"/>
+            </a:pPr>
+            <a:endParaRPr lang="en-US" dirty="0"/>
+          </a:p>
+          <a:p>
+            <a:pPr marL="742950" lvl="1" indent="-285750">
+              <a:buFont typeface="Wingdings" pitchFamily="2" charset="2"/>
+              <a:buChar char="§"/>
+            </a:pPr>
+            <a:endParaRPr lang="en-US" dirty="0"/>
+          </a:p>
+          <a:p>
+            <a:pPr marL="742950" lvl="1" indent="-285750">
+              <a:buFont typeface="Wingdings" pitchFamily="2" charset="2"/>
+              <a:buChar char="§"/>
+            </a:pPr>
+            <a:endParaRPr lang="en-US" dirty="0"/>
+          </a:p>
+          <a:p>
+            <a:pPr marL="742950" lvl="1" indent="-285750">
+              <a:buFont typeface="Wingdings" pitchFamily="2" charset="2"/>
+              <a:buChar char="§"/>
+            </a:pPr>
+            <a:endParaRPr lang="en-US" dirty="0"/>
+          </a:p>
+        </p:txBody>
+      </p:sp>
+    </p:spTree>
+    <p:extLst>
+      <p:ext uri="{BB962C8B-B14F-4D97-AF65-F5344CB8AC3E}">
+        <p14:creationId xmlns:p14="http://schemas.microsoft.com/office/powerpoint/2010/main" val="1919620898"/>
+      </p:ext>
+    </p:extLst>
+  </p:cSld>
+  <p:clrMapOvr>
+    <a:masterClrMapping/>
+  </p:clrMapOvr>
+</p:sld>
+</file>
+
+<file path=ppt/slides/slide18.xml><?xml version="1.0" encoding="utf-8"?>
+<p:sld xmlns:a="http://schemas.openxmlformats.org/drawingml/2006/main" xmlns:r="http://schemas.openxmlformats.org/officeDocument/2006/relationships" xmlns:p="http://schemas.openxmlformats.org/presentationml/2006/main">
+  <p:cSld>
+    <p:spTree>
+      <p:nvGrpSpPr>
+        <p:cNvPr id="1" name=""/>
+        <p:cNvGrpSpPr/>
+        <p:nvPr/>
+      </p:nvGrpSpPr>
+      <p:grpSpPr>
+        <a:xfrm>
+          <a:off x="0" y="0"/>
+          <a:ext cx="0" cy="0"/>
+          <a:chOff x="0" y="0"/>
+          <a:chExt cx="0" cy="0"/>
+        </a:xfrm>
+      </p:grpSpPr>
+      <p:sp>
+        <p:nvSpPr>
+          <p:cNvPr id="6" name="TextBox 5">
+            <a:extLst>
+              <a:ext uri="{FF2B5EF4-FFF2-40B4-BE49-F238E27FC236}">
+                <a16:creationId xmlns:a16="http://schemas.microsoft.com/office/drawing/2014/main" id="{933CA7EB-D821-4578-A186-D330E9178EDE}"/>
+              </a:ext>
+            </a:extLst>
+          </p:cNvPr>
+          <p:cNvSpPr txBox="1"/>
+          <p:nvPr/>
+        </p:nvSpPr>
+        <p:spPr>
+          <a:xfrm>
+            <a:off x="87923" y="28551"/>
+            <a:ext cx="3622432" cy="338554"/>
+          </a:xfrm>
+          <a:prstGeom prst="rect">
+            <a:avLst/>
+          </a:prstGeom>
+          <a:noFill/>
+        </p:spPr>
+        <p:txBody>
+          <a:bodyPr wrap="square" rtlCol="0">
+            <a:spAutoFit/>
+          </a:bodyPr>
+          <a:lstStyle/>
+          <a:p>
+            <a:r>
+              <a:rPr lang="en-PH" sz="1600">
+                <a:solidFill>
+                  <a:schemeClr val="bg1"/>
+                </a:solidFill>
+                <a:latin typeface="Abadi" panose="020B0604020104020204" pitchFamily="34" charset="0"/>
+                <a:cs typeface="Aharoni" panose="020B0604020202020204" pitchFamily="2" charset="-79"/>
+              </a:rPr>
+              <a:t>INTRODUCTION TO COMPUTING</a:t>
+            </a:r>
+          </a:p>
+        </p:txBody>
+      </p:sp>
+      <p:sp>
+        <p:nvSpPr>
+          <p:cNvPr id="7" name="TextBox 6">
+            <a:extLst>
+              <a:ext uri="{FF2B5EF4-FFF2-40B4-BE49-F238E27FC236}">
+                <a16:creationId xmlns:a16="http://schemas.microsoft.com/office/drawing/2014/main" id="{9B128FD4-EE77-4086-837E-5EAF83B0DDD1}"/>
+              </a:ext>
+            </a:extLst>
+          </p:cNvPr>
+          <p:cNvSpPr txBox="1"/>
+          <p:nvPr/>
+        </p:nvSpPr>
+        <p:spPr>
+          <a:xfrm>
+            <a:off x="9182099" y="13190"/>
+            <a:ext cx="2948354" cy="338554"/>
+          </a:xfrm>
+          <a:prstGeom prst="rect">
+            <a:avLst/>
+          </a:prstGeom>
+          <a:noFill/>
+        </p:spPr>
+        <p:txBody>
+          <a:bodyPr wrap="square" rtlCol="0">
+            <a:spAutoFit/>
+          </a:bodyPr>
+          <a:lstStyle/>
+          <a:p>
+            <a:pPr algn="r"/>
+            <a:r>
+              <a:rPr lang="en-US" sz="1600" dirty="0">
+                <a:solidFill>
+                  <a:schemeClr val="bg1"/>
+                </a:solidFill>
+              </a:rPr>
+              <a:t>Course Code: CCINCOM/L</a:t>
+            </a:r>
+            <a:endParaRPr lang="en-PH" sz="1600" dirty="0">
+              <a:solidFill>
+                <a:schemeClr val="bg1"/>
+              </a:solidFill>
+              <a:latin typeface="Abadi" panose="020B0604020202020204" pitchFamily="34" charset="0"/>
+            </a:endParaRPr>
+          </a:p>
+        </p:txBody>
+      </p:sp>
+      <p:sp>
+        <p:nvSpPr>
+          <p:cNvPr id="8" name="TextBox 7">
+            <a:extLst>
+              <a:ext uri="{FF2B5EF4-FFF2-40B4-BE49-F238E27FC236}">
+                <a16:creationId xmlns:a16="http://schemas.microsoft.com/office/drawing/2014/main" id="{B95C7AD6-4918-4294-AA88-B72FB28833FE}"/>
+              </a:ext>
+            </a:extLst>
+          </p:cNvPr>
+          <p:cNvSpPr txBox="1"/>
+          <p:nvPr/>
+        </p:nvSpPr>
+        <p:spPr>
+          <a:xfrm>
+            <a:off x="0" y="6479929"/>
+            <a:ext cx="2461846" cy="338554"/>
+          </a:xfrm>
+          <a:prstGeom prst="rect">
+            <a:avLst/>
+          </a:prstGeom>
+          <a:noFill/>
+        </p:spPr>
+        <p:txBody>
+          <a:bodyPr wrap="square" rtlCol="0">
+            <a:spAutoFit/>
+          </a:bodyPr>
+          <a:lstStyle/>
+          <a:p>
+            <a:pPr algn="ctr"/>
+            <a:r>
+              <a:rPr lang="en-PH" sz="1600">
+                <a:solidFill>
+                  <a:schemeClr val="bg1"/>
+                </a:solidFill>
+                <a:latin typeface="Abadi" panose="020B0604020202020204" pitchFamily="34" charset="0"/>
+              </a:rPr>
+              <a:t>Joseph Marvin R. Imperial</a:t>
+            </a:r>
+          </a:p>
+        </p:txBody>
+      </p:sp>
+      <p:sp>
+        <p:nvSpPr>
+          <p:cNvPr id="9" name="TextBox 8">
+            <a:extLst>
+              <a:ext uri="{FF2B5EF4-FFF2-40B4-BE49-F238E27FC236}">
+                <a16:creationId xmlns:a16="http://schemas.microsoft.com/office/drawing/2014/main" id="{C3136E3D-4CFD-4EFC-98AB-367D0EF3C06B}"/>
+              </a:ext>
+            </a:extLst>
+          </p:cNvPr>
+          <p:cNvSpPr txBox="1"/>
+          <p:nvPr/>
+        </p:nvSpPr>
+        <p:spPr>
+          <a:xfrm>
+            <a:off x="7086601" y="6490896"/>
+            <a:ext cx="5105399" cy="338554"/>
+          </a:xfrm>
+          <a:prstGeom prst="rect">
+            <a:avLst/>
+          </a:prstGeom>
+          <a:noFill/>
+        </p:spPr>
+        <p:txBody>
+          <a:bodyPr wrap="square" rtlCol="0">
+            <a:spAutoFit/>
+          </a:bodyPr>
+          <a:lstStyle/>
+          <a:p>
+            <a:pPr algn="r"/>
+            <a:r>
+              <a:rPr lang="en-PH" sz="1600">
+                <a:solidFill>
+                  <a:schemeClr val="bg1"/>
+                </a:solidFill>
+                <a:latin typeface="Abadi" panose="020B0604020202020204" pitchFamily="34" charset="0"/>
+              </a:rPr>
+              <a:t>NU College of Computing and Information Technologies</a:t>
+            </a:r>
+          </a:p>
+        </p:txBody>
+      </p:sp>
+      <p:sp>
+        <p:nvSpPr>
+          <p:cNvPr id="13" name="Rectangle 12">
+            <a:extLst>
+              <a:ext uri="{FF2B5EF4-FFF2-40B4-BE49-F238E27FC236}">
+                <a16:creationId xmlns:a16="http://schemas.microsoft.com/office/drawing/2014/main" id="{251B30DC-ACC5-404F-B51D-13612F115E3E}"/>
+              </a:ext>
+            </a:extLst>
+          </p:cNvPr>
+          <p:cNvSpPr/>
+          <p:nvPr/>
+        </p:nvSpPr>
+        <p:spPr>
+          <a:xfrm>
+            <a:off x="0" y="6462346"/>
+            <a:ext cx="12192000" cy="395654"/>
+          </a:xfrm>
+          <a:prstGeom prst="rect">
+            <a:avLst/>
+          </a:prstGeom>
+          <a:solidFill>
+            <a:schemeClr val="accent5">
+              <a:lumMod val="50000"/>
+            </a:schemeClr>
+          </a:solidFill>
+          <a:effectLst>
+            <a:outerShdw blurRad="50800" dist="38100" dir="2700000" algn="tl" rotWithShape="0">
+              <a:prstClr val="black">
+                <a:alpha val="40000"/>
+              </a:prstClr>
+            </a:outerShdw>
+          </a:effectLst>
+        </p:spPr>
+        <p:style>
+          <a:lnRef idx="2">
+            <a:schemeClr val="accent1">
+              <a:shade val="50000"/>
+            </a:schemeClr>
+          </a:lnRef>
+          <a:fillRef idx="1">
+            <a:schemeClr val="accent1"/>
+          </a:fillRef>
+          <a:effectRef idx="0">
+            <a:schemeClr val="accent1"/>
+          </a:effectRef>
+          <a:fontRef idx="minor">
+            <a:schemeClr val="lt1"/>
+          </a:fontRef>
+        </p:style>
+        <p:txBody>
+          <a:bodyPr rtlCol="0" anchor="ctr"/>
+          <a:lstStyle/>
+          <a:p>
+            <a:pPr algn="ctr"/>
+            <a:endParaRPr lang="en-PH"/>
+          </a:p>
+        </p:txBody>
+      </p:sp>
+      <p:sp>
+        <p:nvSpPr>
+          <p:cNvPr id="14" name="TextBox 13">
+            <a:extLst>
+              <a:ext uri="{FF2B5EF4-FFF2-40B4-BE49-F238E27FC236}">
+                <a16:creationId xmlns:a16="http://schemas.microsoft.com/office/drawing/2014/main" id="{ACC57CA2-30CA-4DDD-A941-8B9CC393DAFA}"/>
+              </a:ext>
+            </a:extLst>
+          </p:cNvPr>
+          <p:cNvSpPr txBox="1"/>
+          <p:nvPr/>
+        </p:nvSpPr>
+        <p:spPr>
+          <a:xfrm>
+            <a:off x="0" y="6490896"/>
+            <a:ext cx="3622432" cy="338554"/>
+          </a:xfrm>
+          <a:prstGeom prst="rect">
+            <a:avLst/>
+          </a:prstGeom>
+          <a:noFill/>
+        </p:spPr>
+        <p:txBody>
+          <a:bodyPr wrap="square" rtlCol="0">
+            <a:spAutoFit/>
+          </a:bodyPr>
+          <a:lstStyle/>
+          <a:p>
+            <a:r>
+              <a:rPr lang="en-PH" sz="1600">
+                <a:solidFill>
+                  <a:schemeClr val="bg1"/>
+                </a:solidFill>
+                <a:latin typeface="Abadi" panose="020B0604020104020204" pitchFamily="34" charset="0"/>
+                <a:cs typeface="Aharoni" panose="020B0604020202020204" pitchFamily="2" charset="-79"/>
+              </a:rPr>
+              <a:t>REINFORCEMENT LEARNING</a:t>
+            </a:r>
+          </a:p>
+        </p:txBody>
+      </p:sp>
+      <p:sp>
+        <p:nvSpPr>
+          <p:cNvPr id="15" name="TextBox 14">
+            <a:extLst>
+              <a:ext uri="{FF2B5EF4-FFF2-40B4-BE49-F238E27FC236}">
+                <a16:creationId xmlns:a16="http://schemas.microsoft.com/office/drawing/2014/main" id="{31237222-F604-49F1-8989-AF06AF20EDD3}"/>
+              </a:ext>
+            </a:extLst>
+          </p:cNvPr>
+          <p:cNvSpPr txBox="1"/>
+          <p:nvPr/>
+        </p:nvSpPr>
+        <p:spPr>
+          <a:xfrm>
+            <a:off x="9243646" y="6490896"/>
+            <a:ext cx="2948354" cy="338554"/>
+          </a:xfrm>
+          <a:prstGeom prst="rect">
+            <a:avLst/>
+          </a:prstGeom>
+          <a:noFill/>
+        </p:spPr>
+        <p:txBody>
+          <a:bodyPr wrap="square" rtlCol="0">
+            <a:spAutoFit/>
+          </a:bodyPr>
+          <a:lstStyle/>
+          <a:p>
+            <a:pPr algn="r"/>
+            <a:r>
+              <a:rPr lang="en-US" sz="1600">
+                <a:solidFill>
+                  <a:schemeClr val="bg1"/>
+                </a:solidFill>
+                <a:latin typeface="Abadi" panose="020B0604020104020204" pitchFamily="34" charset="0"/>
+              </a:rPr>
+              <a:t>Course Code: CCRNFLRL</a:t>
+            </a:r>
+            <a:endParaRPr lang="en-PH" sz="1600">
+              <a:solidFill>
+                <a:schemeClr val="bg1"/>
+              </a:solidFill>
+              <a:latin typeface="Abadi" panose="020B0604020104020204" pitchFamily="34" charset="0"/>
+            </a:endParaRPr>
+          </a:p>
+        </p:txBody>
+      </p:sp>
+      <p:sp>
+        <p:nvSpPr>
+          <p:cNvPr id="5" name="Title 4">
+            <a:extLst>
+              <a:ext uri="{FF2B5EF4-FFF2-40B4-BE49-F238E27FC236}">
+                <a16:creationId xmlns:a16="http://schemas.microsoft.com/office/drawing/2014/main" id="{EC47D021-EEC4-42AC-B4C3-BC584CB5BC9D}"/>
+              </a:ext>
+            </a:extLst>
+          </p:cNvPr>
+          <p:cNvSpPr>
+            <a:spLocks noGrp="1"/>
+          </p:cNvSpPr>
+          <p:nvPr>
+            <p:ph type="title"/>
+          </p:nvPr>
+        </p:nvSpPr>
+        <p:spPr>
+          <a:xfrm>
+            <a:off x="352425" y="292273"/>
+            <a:ext cx="11458574" cy="869778"/>
+          </a:xfrm>
+        </p:spPr>
+        <p:txBody>
+          <a:bodyPr/>
+          <a:lstStyle/>
+          <a:p>
+            <a:r>
+              <a:rPr lang="en-PH" b="1" dirty="0">
+                <a:latin typeface="+mn-lt"/>
+              </a:rPr>
+              <a:t>Unified view of Reinforcement Learning</a:t>
+            </a:r>
+          </a:p>
+        </p:txBody>
+      </p:sp>
+      <p:pic>
+        <p:nvPicPr>
+          <p:cNvPr id="16" name="Picture 15">
+            <a:extLst>
+              <a:ext uri="{FF2B5EF4-FFF2-40B4-BE49-F238E27FC236}">
+                <a16:creationId xmlns:a16="http://schemas.microsoft.com/office/drawing/2014/main" id="{1147C984-87D1-A1F3-2CAD-5A4CFCFD2316}"/>
+              </a:ext>
+            </a:extLst>
+          </p:cNvPr>
+          <p:cNvPicPr>
+            <a:picLocks noChangeAspect="1"/>
+          </p:cNvPicPr>
+          <p:nvPr/>
+        </p:nvPicPr>
+        <p:blipFill>
+          <a:blip r:embed="rId2">
+            <a:extLst>
+              <a:ext uri="{28A0092B-C50C-407E-A947-70E740481C1C}">
+                <a14:useLocalDpi xmlns:a14="http://schemas.microsoft.com/office/drawing/2010/main" val="0"/>
+              </a:ext>
+            </a:extLst>
+          </a:blip>
+          <a:stretch>
+            <a:fillRect/>
+          </a:stretch>
+        </p:blipFill>
+        <p:spPr>
+          <a:xfrm>
+            <a:off x="2195512" y="1233935"/>
+            <a:ext cx="7772400" cy="5156527"/>
+          </a:xfrm>
+          <a:prstGeom prst="rect">
+            <a:avLst/>
+          </a:prstGeom>
+        </p:spPr>
+      </p:pic>
+    </p:spTree>
+    <p:extLst>
+      <p:ext uri="{BB962C8B-B14F-4D97-AF65-F5344CB8AC3E}">
+        <p14:creationId xmlns:p14="http://schemas.microsoft.com/office/powerpoint/2010/main" val="3307047475"/>
+      </p:ext>
+    </p:extLst>
+  </p:cSld>
+  <p:clrMapOvr>
+    <a:masterClrMapping/>
+  </p:clrMapOvr>
+</p:sld>
+</file>
+
+<file path=ppt/slides/slide19.xml><?xml version="1.0" encoding="utf-8"?>
+<p:sld xmlns:a="http://schemas.openxmlformats.org/drawingml/2006/main" xmlns:r="http://schemas.openxmlformats.org/officeDocument/2006/relationships" xmlns:p="http://schemas.openxmlformats.org/presentationml/2006/main">
+  <p:cSld>
+    <p:spTree>
+      <p:nvGrpSpPr>
+        <p:cNvPr id="1" name=""/>
+        <p:cNvGrpSpPr/>
+        <p:nvPr/>
+      </p:nvGrpSpPr>
+      <p:grpSpPr>
+        <a:xfrm>
+          <a:off x="0" y="0"/>
+          <a:ext cx="0" cy="0"/>
+          <a:chOff x="0" y="0"/>
+          <a:chExt cx="0" cy="0"/>
+        </a:xfrm>
+      </p:grpSpPr>
+      <p:sp>
+        <p:nvSpPr>
+          <p:cNvPr id="6" name="TextBox 5">
+            <a:extLst>
+              <a:ext uri="{FF2B5EF4-FFF2-40B4-BE49-F238E27FC236}">
+                <a16:creationId xmlns:a16="http://schemas.microsoft.com/office/drawing/2014/main" id="{933CA7EB-D821-4578-A186-D330E9178EDE}"/>
+              </a:ext>
+            </a:extLst>
+          </p:cNvPr>
+          <p:cNvSpPr txBox="1"/>
+          <p:nvPr/>
+        </p:nvSpPr>
+        <p:spPr>
+          <a:xfrm>
+            <a:off x="87923" y="28551"/>
+            <a:ext cx="3622432" cy="338554"/>
+          </a:xfrm>
+          <a:prstGeom prst="rect">
+            <a:avLst/>
+          </a:prstGeom>
+          <a:noFill/>
+        </p:spPr>
+        <p:txBody>
+          <a:bodyPr wrap="square" rtlCol="0">
+            <a:spAutoFit/>
+          </a:bodyPr>
+          <a:lstStyle/>
+          <a:p>
+            <a:r>
+              <a:rPr lang="en-PH" sz="1600">
+                <a:solidFill>
+                  <a:schemeClr val="bg1"/>
+                </a:solidFill>
+                <a:latin typeface="Abadi" panose="020B0604020104020204" pitchFamily="34" charset="0"/>
+                <a:cs typeface="Aharoni" panose="020B0604020202020204" pitchFamily="2" charset="-79"/>
+              </a:rPr>
+              <a:t>INTRODUCTION TO COMPUTING</a:t>
+            </a:r>
+          </a:p>
+        </p:txBody>
+      </p:sp>
+      <p:sp>
+        <p:nvSpPr>
+          <p:cNvPr id="7" name="TextBox 6">
+            <a:extLst>
+              <a:ext uri="{FF2B5EF4-FFF2-40B4-BE49-F238E27FC236}">
+                <a16:creationId xmlns:a16="http://schemas.microsoft.com/office/drawing/2014/main" id="{9B128FD4-EE77-4086-837E-5EAF83B0DDD1}"/>
+              </a:ext>
+            </a:extLst>
+          </p:cNvPr>
+          <p:cNvSpPr txBox="1"/>
+          <p:nvPr/>
+        </p:nvSpPr>
+        <p:spPr>
+          <a:xfrm>
+            <a:off x="9182099" y="13190"/>
+            <a:ext cx="2948354" cy="338554"/>
+          </a:xfrm>
+          <a:prstGeom prst="rect">
+            <a:avLst/>
+          </a:prstGeom>
+          <a:noFill/>
+        </p:spPr>
+        <p:txBody>
+          <a:bodyPr wrap="square" rtlCol="0">
+            <a:spAutoFit/>
+          </a:bodyPr>
+          <a:lstStyle/>
+          <a:p>
+            <a:pPr algn="r"/>
+            <a:r>
+              <a:rPr lang="en-US" sz="1600" dirty="0">
+                <a:solidFill>
+                  <a:schemeClr val="bg1"/>
+                </a:solidFill>
+              </a:rPr>
+              <a:t>Course Code: CCINCOM/L</a:t>
+            </a:r>
+            <a:endParaRPr lang="en-PH" sz="1600" dirty="0">
+              <a:solidFill>
+                <a:schemeClr val="bg1"/>
+              </a:solidFill>
+              <a:latin typeface="Abadi" panose="020B0604020202020204" pitchFamily="34" charset="0"/>
+            </a:endParaRPr>
+          </a:p>
+        </p:txBody>
+      </p:sp>
+      <p:sp>
+        <p:nvSpPr>
+          <p:cNvPr id="8" name="TextBox 7">
+            <a:extLst>
+              <a:ext uri="{FF2B5EF4-FFF2-40B4-BE49-F238E27FC236}">
+                <a16:creationId xmlns:a16="http://schemas.microsoft.com/office/drawing/2014/main" id="{B95C7AD6-4918-4294-AA88-B72FB28833FE}"/>
+              </a:ext>
+            </a:extLst>
+          </p:cNvPr>
+          <p:cNvSpPr txBox="1"/>
+          <p:nvPr/>
+        </p:nvSpPr>
+        <p:spPr>
+          <a:xfrm>
+            <a:off x="0" y="6479929"/>
+            <a:ext cx="2461846" cy="338554"/>
+          </a:xfrm>
+          <a:prstGeom prst="rect">
+            <a:avLst/>
+          </a:prstGeom>
+          <a:noFill/>
+        </p:spPr>
+        <p:txBody>
+          <a:bodyPr wrap="square" rtlCol="0">
+            <a:spAutoFit/>
+          </a:bodyPr>
+          <a:lstStyle/>
+          <a:p>
+            <a:pPr algn="ctr"/>
+            <a:r>
+              <a:rPr lang="en-PH" sz="1600">
+                <a:solidFill>
+                  <a:schemeClr val="bg1"/>
+                </a:solidFill>
+                <a:latin typeface="Abadi" panose="020B0604020202020204" pitchFamily="34" charset="0"/>
+              </a:rPr>
+              <a:t>Joseph Marvin R. Imperial</a:t>
+            </a:r>
+          </a:p>
+        </p:txBody>
+      </p:sp>
+      <p:sp>
+        <p:nvSpPr>
+          <p:cNvPr id="9" name="TextBox 8">
+            <a:extLst>
+              <a:ext uri="{FF2B5EF4-FFF2-40B4-BE49-F238E27FC236}">
+                <a16:creationId xmlns:a16="http://schemas.microsoft.com/office/drawing/2014/main" id="{C3136E3D-4CFD-4EFC-98AB-367D0EF3C06B}"/>
+              </a:ext>
+            </a:extLst>
+          </p:cNvPr>
+          <p:cNvSpPr txBox="1"/>
+          <p:nvPr/>
+        </p:nvSpPr>
+        <p:spPr>
+          <a:xfrm>
+            <a:off x="7086601" y="6490896"/>
+            <a:ext cx="5105399" cy="338554"/>
+          </a:xfrm>
+          <a:prstGeom prst="rect">
+            <a:avLst/>
+          </a:prstGeom>
+          <a:noFill/>
+        </p:spPr>
+        <p:txBody>
+          <a:bodyPr wrap="square" rtlCol="0">
+            <a:spAutoFit/>
+          </a:bodyPr>
+          <a:lstStyle/>
+          <a:p>
+            <a:pPr algn="r"/>
+            <a:r>
+              <a:rPr lang="en-PH" sz="1600">
+                <a:solidFill>
+                  <a:schemeClr val="bg1"/>
+                </a:solidFill>
+                <a:latin typeface="Abadi" panose="020B0604020202020204" pitchFamily="34" charset="0"/>
+              </a:rPr>
+              <a:t>NU College of Computing and Information Technologies</a:t>
+            </a:r>
+          </a:p>
+        </p:txBody>
+      </p:sp>
+      <p:sp>
+        <p:nvSpPr>
+          <p:cNvPr id="13" name="Rectangle 12">
+            <a:extLst>
+              <a:ext uri="{FF2B5EF4-FFF2-40B4-BE49-F238E27FC236}">
+                <a16:creationId xmlns:a16="http://schemas.microsoft.com/office/drawing/2014/main" id="{251B30DC-ACC5-404F-B51D-13612F115E3E}"/>
+              </a:ext>
+            </a:extLst>
+          </p:cNvPr>
+          <p:cNvSpPr/>
+          <p:nvPr/>
+        </p:nvSpPr>
+        <p:spPr>
+          <a:xfrm>
+            <a:off x="0" y="6462346"/>
+            <a:ext cx="12192000" cy="395654"/>
+          </a:xfrm>
+          <a:prstGeom prst="rect">
+            <a:avLst/>
+          </a:prstGeom>
+          <a:solidFill>
+            <a:schemeClr val="accent5">
+              <a:lumMod val="50000"/>
+            </a:schemeClr>
+          </a:solidFill>
+          <a:effectLst>
+            <a:outerShdw blurRad="50800" dist="38100" dir="2700000" algn="tl" rotWithShape="0">
+              <a:prstClr val="black">
+                <a:alpha val="40000"/>
+              </a:prstClr>
+            </a:outerShdw>
+          </a:effectLst>
+        </p:spPr>
+        <p:style>
+          <a:lnRef idx="2">
+            <a:schemeClr val="accent1">
+              <a:shade val="50000"/>
+            </a:schemeClr>
+          </a:lnRef>
+          <a:fillRef idx="1">
+            <a:schemeClr val="accent1"/>
+          </a:fillRef>
+          <a:effectRef idx="0">
+            <a:schemeClr val="accent1"/>
+          </a:effectRef>
+          <a:fontRef idx="minor">
+            <a:schemeClr val="lt1"/>
+          </a:fontRef>
+        </p:style>
+        <p:txBody>
+          <a:bodyPr rtlCol="0" anchor="ctr"/>
+          <a:lstStyle/>
+          <a:p>
+            <a:pPr algn="ctr"/>
+            <a:endParaRPr lang="en-PH"/>
+          </a:p>
+        </p:txBody>
+      </p:sp>
+      <p:sp>
+        <p:nvSpPr>
+          <p:cNvPr id="14" name="TextBox 13">
+            <a:extLst>
+              <a:ext uri="{FF2B5EF4-FFF2-40B4-BE49-F238E27FC236}">
+                <a16:creationId xmlns:a16="http://schemas.microsoft.com/office/drawing/2014/main" id="{ACC57CA2-30CA-4DDD-A941-8B9CC393DAFA}"/>
+              </a:ext>
+            </a:extLst>
+          </p:cNvPr>
+          <p:cNvSpPr txBox="1"/>
+          <p:nvPr/>
+        </p:nvSpPr>
+        <p:spPr>
+          <a:xfrm>
+            <a:off x="0" y="6490896"/>
+            <a:ext cx="3622432" cy="338554"/>
+          </a:xfrm>
+          <a:prstGeom prst="rect">
+            <a:avLst/>
+          </a:prstGeom>
+          <a:noFill/>
+        </p:spPr>
+        <p:txBody>
+          <a:bodyPr wrap="square" rtlCol="0">
+            <a:spAutoFit/>
+          </a:bodyPr>
+          <a:lstStyle/>
+          <a:p>
+            <a:r>
+              <a:rPr lang="en-PH" sz="1600">
+                <a:solidFill>
+                  <a:schemeClr val="bg1"/>
+                </a:solidFill>
+                <a:latin typeface="Abadi" panose="020B0604020104020204" pitchFamily="34" charset="0"/>
+                <a:cs typeface="Aharoni" panose="020B0604020202020204" pitchFamily="2" charset="-79"/>
+              </a:rPr>
+              <a:t>REINFORCEMENT LEARNING</a:t>
+            </a:r>
+          </a:p>
+        </p:txBody>
+      </p:sp>
+      <p:sp>
+        <p:nvSpPr>
+          <p:cNvPr id="15" name="TextBox 14">
+            <a:extLst>
+              <a:ext uri="{FF2B5EF4-FFF2-40B4-BE49-F238E27FC236}">
+                <a16:creationId xmlns:a16="http://schemas.microsoft.com/office/drawing/2014/main" id="{31237222-F604-49F1-8989-AF06AF20EDD3}"/>
+              </a:ext>
+            </a:extLst>
+          </p:cNvPr>
+          <p:cNvSpPr txBox="1"/>
+          <p:nvPr/>
+        </p:nvSpPr>
+        <p:spPr>
+          <a:xfrm>
+            <a:off x="9243646" y="6490896"/>
+            <a:ext cx="2948354" cy="338554"/>
+          </a:xfrm>
+          <a:prstGeom prst="rect">
+            <a:avLst/>
+          </a:prstGeom>
+          <a:noFill/>
+        </p:spPr>
+        <p:txBody>
+          <a:bodyPr wrap="square" rtlCol="0">
+            <a:spAutoFit/>
+          </a:bodyPr>
+          <a:lstStyle/>
+          <a:p>
+            <a:pPr algn="r"/>
+            <a:r>
+              <a:rPr lang="en-US" sz="1600">
+                <a:solidFill>
+                  <a:schemeClr val="bg1"/>
+                </a:solidFill>
+                <a:latin typeface="Abadi" panose="020B0604020104020204" pitchFamily="34" charset="0"/>
+              </a:rPr>
+              <a:t>Course Code: CCRNFLRL</a:t>
+            </a:r>
+            <a:endParaRPr lang="en-PH" sz="1600">
+              <a:solidFill>
+                <a:schemeClr val="bg1"/>
+              </a:solidFill>
+              <a:latin typeface="Abadi" panose="020B0604020104020204" pitchFamily="34" charset="0"/>
+            </a:endParaRPr>
+          </a:p>
+        </p:txBody>
+      </p:sp>
+      <p:sp>
+        <p:nvSpPr>
+          <p:cNvPr id="5" name="Title 4">
+            <a:extLst>
+              <a:ext uri="{FF2B5EF4-FFF2-40B4-BE49-F238E27FC236}">
+                <a16:creationId xmlns:a16="http://schemas.microsoft.com/office/drawing/2014/main" id="{EC47D021-EEC4-42AC-B4C3-BC584CB5BC9D}"/>
+              </a:ext>
+            </a:extLst>
+          </p:cNvPr>
+          <p:cNvSpPr>
+            <a:spLocks noGrp="1"/>
+          </p:cNvSpPr>
+          <p:nvPr>
+            <p:ph type="title"/>
+          </p:nvPr>
+        </p:nvSpPr>
+        <p:spPr>
+          <a:xfrm>
+            <a:off x="352425" y="292273"/>
+            <a:ext cx="11458574" cy="869778"/>
+          </a:xfrm>
+        </p:spPr>
+        <p:txBody>
+          <a:bodyPr/>
+          <a:lstStyle/>
+          <a:p>
+            <a:r>
+              <a:rPr lang="en-PH" b="1" dirty="0">
+                <a:latin typeface="+mn-lt"/>
+              </a:rPr>
+              <a:t>TD (</a:t>
+            </a:r>
+            <a:r>
+              <a:rPr lang="el-GR" b="1" i="0" u="none" strike="noStrike" dirty="0">
+                <a:solidFill>
+                  <a:srgbClr val="222222"/>
+                </a:solidFill>
+                <a:effectLst/>
+                <a:latin typeface="times new roman" panose="02020603050405020304" pitchFamily="18" charset="0"/>
+              </a:rPr>
+              <a:t>λ</a:t>
+            </a:r>
+            <a:r>
+              <a:rPr lang="en-US" b="1" i="0" u="none" strike="noStrike" dirty="0">
+                <a:solidFill>
+                  <a:srgbClr val="222222"/>
+                </a:solidFill>
+                <a:effectLst/>
+                <a:latin typeface="times new roman" panose="02020603050405020304" pitchFamily="18" charset="0"/>
+              </a:rPr>
+              <a:t>)</a:t>
+            </a:r>
+            <a:endParaRPr lang="en-PH" b="1" dirty="0">
+              <a:latin typeface="+mn-lt"/>
+            </a:endParaRPr>
+          </a:p>
+        </p:txBody>
+      </p:sp>
+      <p:pic>
+        <p:nvPicPr>
+          <p:cNvPr id="3" name="Picture 2">
+            <a:extLst>
+              <a:ext uri="{FF2B5EF4-FFF2-40B4-BE49-F238E27FC236}">
+                <a16:creationId xmlns:a16="http://schemas.microsoft.com/office/drawing/2014/main" id="{77767BE5-ED46-D56A-B20C-4D57D1019883}"/>
+              </a:ext>
+            </a:extLst>
+          </p:cNvPr>
+          <p:cNvPicPr>
+            <a:picLocks noChangeAspect="1"/>
+          </p:cNvPicPr>
+          <p:nvPr/>
+        </p:nvPicPr>
+        <p:blipFill>
+          <a:blip r:embed="rId2">
+            <a:extLst>
+              <a:ext uri="{28A0092B-C50C-407E-A947-70E740481C1C}">
+                <a14:useLocalDpi xmlns:a14="http://schemas.microsoft.com/office/drawing/2010/main" val="0"/>
+              </a:ext>
+            </a:extLst>
+          </a:blip>
+          <a:stretch>
+            <a:fillRect/>
+          </a:stretch>
+        </p:blipFill>
+        <p:spPr>
+          <a:xfrm>
+            <a:off x="2195512" y="1162051"/>
+            <a:ext cx="7772400" cy="4779199"/>
+          </a:xfrm>
+          <a:prstGeom prst="rect">
+            <a:avLst/>
+          </a:prstGeom>
+        </p:spPr>
+      </p:pic>
+    </p:spTree>
+    <p:extLst>
+      <p:ext uri="{BB962C8B-B14F-4D97-AF65-F5344CB8AC3E}">
+        <p14:creationId xmlns:p14="http://schemas.microsoft.com/office/powerpoint/2010/main" val="2941283396"/>
       </p:ext>
     </p:extLst>
   </p:cSld>
@@ -12615,6 +14329,956 @@
     <p:extLst>
       <p:ext uri="{BB962C8B-B14F-4D97-AF65-F5344CB8AC3E}">
         <p14:creationId xmlns:p14="http://schemas.microsoft.com/office/powerpoint/2010/main" val="1306506128"/>
+      </p:ext>
+    </p:extLst>
+  </p:cSld>
+  <p:clrMapOvr>
+    <a:masterClrMapping/>
+  </p:clrMapOvr>
+</p:sld>
+</file>
+
+<file path=ppt/slides/slide20.xml><?xml version="1.0" encoding="utf-8"?>
+<p:sld xmlns:a="http://schemas.openxmlformats.org/drawingml/2006/main" xmlns:r="http://schemas.openxmlformats.org/officeDocument/2006/relationships" xmlns:p="http://schemas.openxmlformats.org/presentationml/2006/main">
+  <p:cSld>
+    <p:spTree>
+      <p:nvGrpSpPr>
+        <p:cNvPr id="1" name=""/>
+        <p:cNvGrpSpPr/>
+        <p:nvPr/>
+      </p:nvGrpSpPr>
+      <p:grpSpPr>
+        <a:xfrm>
+          <a:off x="0" y="0"/>
+          <a:ext cx="0" cy="0"/>
+          <a:chOff x="0" y="0"/>
+          <a:chExt cx="0" cy="0"/>
+        </a:xfrm>
+      </p:grpSpPr>
+      <p:sp>
+        <p:nvSpPr>
+          <p:cNvPr id="6" name="TextBox 5">
+            <a:extLst>
+              <a:ext uri="{FF2B5EF4-FFF2-40B4-BE49-F238E27FC236}">
+                <a16:creationId xmlns:a16="http://schemas.microsoft.com/office/drawing/2014/main" id="{933CA7EB-D821-4578-A186-D330E9178EDE}"/>
+              </a:ext>
+            </a:extLst>
+          </p:cNvPr>
+          <p:cNvSpPr txBox="1"/>
+          <p:nvPr/>
+        </p:nvSpPr>
+        <p:spPr>
+          <a:xfrm>
+            <a:off x="87923" y="28551"/>
+            <a:ext cx="3622432" cy="338554"/>
+          </a:xfrm>
+          <a:prstGeom prst="rect">
+            <a:avLst/>
+          </a:prstGeom>
+          <a:noFill/>
+        </p:spPr>
+        <p:txBody>
+          <a:bodyPr wrap="square" rtlCol="0">
+            <a:spAutoFit/>
+          </a:bodyPr>
+          <a:lstStyle/>
+          <a:p>
+            <a:r>
+              <a:rPr lang="en-PH" sz="1600">
+                <a:solidFill>
+                  <a:schemeClr val="bg1"/>
+                </a:solidFill>
+                <a:latin typeface="Abadi" panose="020B0604020104020204" pitchFamily="34" charset="0"/>
+                <a:cs typeface="Aharoni" panose="020B0604020202020204" pitchFamily="2" charset="-79"/>
+              </a:rPr>
+              <a:t>INTRODUCTION TO COMPUTING</a:t>
+            </a:r>
+          </a:p>
+        </p:txBody>
+      </p:sp>
+      <p:sp>
+        <p:nvSpPr>
+          <p:cNvPr id="7" name="TextBox 6">
+            <a:extLst>
+              <a:ext uri="{FF2B5EF4-FFF2-40B4-BE49-F238E27FC236}">
+                <a16:creationId xmlns:a16="http://schemas.microsoft.com/office/drawing/2014/main" id="{9B128FD4-EE77-4086-837E-5EAF83B0DDD1}"/>
+              </a:ext>
+            </a:extLst>
+          </p:cNvPr>
+          <p:cNvSpPr txBox="1"/>
+          <p:nvPr/>
+        </p:nvSpPr>
+        <p:spPr>
+          <a:xfrm>
+            <a:off x="9182099" y="13190"/>
+            <a:ext cx="2948354" cy="338554"/>
+          </a:xfrm>
+          <a:prstGeom prst="rect">
+            <a:avLst/>
+          </a:prstGeom>
+          <a:noFill/>
+        </p:spPr>
+        <p:txBody>
+          <a:bodyPr wrap="square" rtlCol="0">
+            <a:spAutoFit/>
+          </a:bodyPr>
+          <a:lstStyle/>
+          <a:p>
+            <a:pPr algn="r"/>
+            <a:r>
+              <a:rPr lang="en-US" sz="1600" dirty="0">
+                <a:solidFill>
+                  <a:schemeClr val="bg1"/>
+                </a:solidFill>
+              </a:rPr>
+              <a:t>Course Code: CCINCOM/L</a:t>
+            </a:r>
+            <a:endParaRPr lang="en-PH" sz="1600" dirty="0">
+              <a:solidFill>
+                <a:schemeClr val="bg1"/>
+              </a:solidFill>
+              <a:latin typeface="Abadi" panose="020B0604020202020204" pitchFamily="34" charset="0"/>
+            </a:endParaRPr>
+          </a:p>
+        </p:txBody>
+      </p:sp>
+      <p:sp>
+        <p:nvSpPr>
+          <p:cNvPr id="8" name="TextBox 7">
+            <a:extLst>
+              <a:ext uri="{FF2B5EF4-FFF2-40B4-BE49-F238E27FC236}">
+                <a16:creationId xmlns:a16="http://schemas.microsoft.com/office/drawing/2014/main" id="{B95C7AD6-4918-4294-AA88-B72FB28833FE}"/>
+              </a:ext>
+            </a:extLst>
+          </p:cNvPr>
+          <p:cNvSpPr txBox="1"/>
+          <p:nvPr/>
+        </p:nvSpPr>
+        <p:spPr>
+          <a:xfrm>
+            <a:off x="0" y="6479929"/>
+            <a:ext cx="2461846" cy="338554"/>
+          </a:xfrm>
+          <a:prstGeom prst="rect">
+            <a:avLst/>
+          </a:prstGeom>
+          <a:noFill/>
+        </p:spPr>
+        <p:txBody>
+          <a:bodyPr wrap="square" rtlCol="0">
+            <a:spAutoFit/>
+          </a:bodyPr>
+          <a:lstStyle/>
+          <a:p>
+            <a:pPr algn="ctr"/>
+            <a:r>
+              <a:rPr lang="en-PH" sz="1600">
+                <a:solidFill>
+                  <a:schemeClr val="bg1"/>
+                </a:solidFill>
+                <a:latin typeface="Abadi" panose="020B0604020202020204" pitchFamily="34" charset="0"/>
+              </a:rPr>
+              <a:t>Joseph Marvin R. Imperial</a:t>
+            </a:r>
+          </a:p>
+        </p:txBody>
+      </p:sp>
+      <p:sp>
+        <p:nvSpPr>
+          <p:cNvPr id="9" name="TextBox 8">
+            <a:extLst>
+              <a:ext uri="{FF2B5EF4-FFF2-40B4-BE49-F238E27FC236}">
+                <a16:creationId xmlns:a16="http://schemas.microsoft.com/office/drawing/2014/main" id="{C3136E3D-4CFD-4EFC-98AB-367D0EF3C06B}"/>
+              </a:ext>
+            </a:extLst>
+          </p:cNvPr>
+          <p:cNvSpPr txBox="1"/>
+          <p:nvPr/>
+        </p:nvSpPr>
+        <p:spPr>
+          <a:xfrm>
+            <a:off x="7086601" y="6490896"/>
+            <a:ext cx="5105399" cy="338554"/>
+          </a:xfrm>
+          <a:prstGeom prst="rect">
+            <a:avLst/>
+          </a:prstGeom>
+          <a:noFill/>
+        </p:spPr>
+        <p:txBody>
+          <a:bodyPr wrap="square" rtlCol="0">
+            <a:spAutoFit/>
+          </a:bodyPr>
+          <a:lstStyle/>
+          <a:p>
+            <a:pPr algn="r"/>
+            <a:r>
+              <a:rPr lang="en-PH" sz="1600">
+                <a:solidFill>
+                  <a:schemeClr val="bg1"/>
+                </a:solidFill>
+                <a:latin typeface="Abadi" panose="020B0604020202020204" pitchFamily="34" charset="0"/>
+              </a:rPr>
+              <a:t>NU College of Computing and Information Technologies</a:t>
+            </a:r>
+          </a:p>
+        </p:txBody>
+      </p:sp>
+      <p:sp>
+        <p:nvSpPr>
+          <p:cNvPr id="13" name="Rectangle 12">
+            <a:extLst>
+              <a:ext uri="{FF2B5EF4-FFF2-40B4-BE49-F238E27FC236}">
+                <a16:creationId xmlns:a16="http://schemas.microsoft.com/office/drawing/2014/main" id="{251B30DC-ACC5-404F-B51D-13612F115E3E}"/>
+              </a:ext>
+            </a:extLst>
+          </p:cNvPr>
+          <p:cNvSpPr/>
+          <p:nvPr/>
+        </p:nvSpPr>
+        <p:spPr>
+          <a:xfrm>
+            <a:off x="0" y="6462346"/>
+            <a:ext cx="12192000" cy="395654"/>
+          </a:xfrm>
+          <a:prstGeom prst="rect">
+            <a:avLst/>
+          </a:prstGeom>
+          <a:solidFill>
+            <a:schemeClr val="accent5">
+              <a:lumMod val="50000"/>
+            </a:schemeClr>
+          </a:solidFill>
+          <a:effectLst>
+            <a:outerShdw blurRad="50800" dist="38100" dir="2700000" algn="tl" rotWithShape="0">
+              <a:prstClr val="black">
+                <a:alpha val="40000"/>
+              </a:prstClr>
+            </a:outerShdw>
+          </a:effectLst>
+        </p:spPr>
+        <p:style>
+          <a:lnRef idx="2">
+            <a:schemeClr val="accent1">
+              <a:shade val="50000"/>
+            </a:schemeClr>
+          </a:lnRef>
+          <a:fillRef idx="1">
+            <a:schemeClr val="accent1"/>
+          </a:fillRef>
+          <a:effectRef idx="0">
+            <a:schemeClr val="accent1"/>
+          </a:effectRef>
+          <a:fontRef idx="minor">
+            <a:schemeClr val="lt1"/>
+          </a:fontRef>
+        </p:style>
+        <p:txBody>
+          <a:bodyPr rtlCol="0" anchor="ctr"/>
+          <a:lstStyle/>
+          <a:p>
+            <a:pPr algn="ctr"/>
+            <a:endParaRPr lang="en-PH"/>
+          </a:p>
+        </p:txBody>
+      </p:sp>
+      <p:sp>
+        <p:nvSpPr>
+          <p:cNvPr id="14" name="TextBox 13">
+            <a:extLst>
+              <a:ext uri="{FF2B5EF4-FFF2-40B4-BE49-F238E27FC236}">
+                <a16:creationId xmlns:a16="http://schemas.microsoft.com/office/drawing/2014/main" id="{ACC57CA2-30CA-4DDD-A941-8B9CC393DAFA}"/>
+              </a:ext>
+            </a:extLst>
+          </p:cNvPr>
+          <p:cNvSpPr txBox="1"/>
+          <p:nvPr/>
+        </p:nvSpPr>
+        <p:spPr>
+          <a:xfrm>
+            <a:off x="0" y="6490896"/>
+            <a:ext cx="3622432" cy="338554"/>
+          </a:xfrm>
+          <a:prstGeom prst="rect">
+            <a:avLst/>
+          </a:prstGeom>
+          <a:noFill/>
+        </p:spPr>
+        <p:txBody>
+          <a:bodyPr wrap="square" rtlCol="0">
+            <a:spAutoFit/>
+          </a:bodyPr>
+          <a:lstStyle/>
+          <a:p>
+            <a:r>
+              <a:rPr lang="en-PH" sz="1600">
+                <a:solidFill>
+                  <a:schemeClr val="bg1"/>
+                </a:solidFill>
+                <a:latin typeface="Abadi" panose="020B0604020104020204" pitchFamily="34" charset="0"/>
+                <a:cs typeface="Aharoni" panose="020B0604020202020204" pitchFamily="2" charset="-79"/>
+              </a:rPr>
+              <a:t>REINFORCEMENT LEARNING</a:t>
+            </a:r>
+          </a:p>
+        </p:txBody>
+      </p:sp>
+      <p:sp>
+        <p:nvSpPr>
+          <p:cNvPr id="15" name="TextBox 14">
+            <a:extLst>
+              <a:ext uri="{FF2B5EF4-FFF2-40B4-BE49-F238E27FC236}">
+                <a16:creationId xmlns:a16="http://schemas.microsoft.com/office/drawing/2014/main" id="{31237222-F604-49F1-8989-AF06AF20EDD3}"/>
+              </a:ext>
+            </a:extLst>
+          </p:cNvPr>
+          <p:cNvSpPr txBox="1"/>
+          <p:nvPr/>
+        </p:nvSpPr>
+        <p:spPr>
+          <a:xfrm>
+            <a:off x="9243646" y="6490896"/>
+            <a:ext cx="2948354" cy="338554"/>
+          </a:xfrm>
+          <a:prstGeom prst="rect">
+            <a:avLst/>
+          </a:prstGeom>
+          <a:noFill/>
+        </p:spPr>
+        <p:txBody>
+          <a:bodyPr wrap="square" rtlCol="0">
+            <a:spAutoFit/>
+          </a:bodyPr>
+          <a:lstStyle/>
+          <a:p>
+            <a:pPr algn="r"/>
+            <a:r>
+              <a:rPr lang="en-US" sz="1600">
+                <a:solidFill>
+                  <a:schemeClr val="bg1"/>
+                </a:solidFill>
+                <a:latin typeface="Abadi" panose="020B0604020104020204" pitchFamily="34" charset="0"/>
+              </a:rPr>
+              <a:t>Course Code: CCRNFLRL</a:t>
+            </a:r>
+            <a:endParaRPr lang="en-PH" sz="1600">
+              <a:solidFill>
+                <a:schemeClr val="bg1"/>
+              </a:solidFill>
+              <a:latin typeface="Abadi" panose="020B0604020104020204" pitchFamily="34" charset="0"/>
+            </a:endParaRPr>
+          </a:p>
+        </p:txBody>
+      </p:sp>
+      <p:sp>
+        <p:nvSpPr>
+          <p:cNvPr id="5" name="Title 4">
+            <a:extLst>
+              <a:ext uri="{FF2B5EF4-FFF2-40B4-BE49-F238E27FC236}">
+                <a16:creationId xmlns:a16="http://schemas.microsoft.com/office/drawing/2014/main" id="{EC47D021-EEC4-42AC-B4C3-BC584CB5BC9D}"/>
+              </a:ext>
+            </a:extLst>
+          </p:cNvPr>
+          <p:cNvSpPr>
+            <a:spLocks noGrp="1"/>
+          </p:cNvSpPr>
+          <p:nvPr>
+            <p:ph type="title"/>
+          </p:nvPr>
+        </p:nvSpPr>
+        <p:spPr>
+          <a:xfrm>
+            <a:off x="352425" y="292273"/>
+            <a:ext cx="11458574" cy="869778"/>
+          </a:xfrm>
+        </p:spPr>
+        <p:txBody>
+          <a:bodyPr/>
+          <a:lstStyle/>
+          <a:p>
+            <a:r>
+              <a:rPr lang="en-PH" b="1" dirty="0">
+                <a:latin typeface="+mn-lt"/>
+              </a:rPr>
+              <a:t>TD (</a:t>
+            </a:r>
+            <a:r>
+              <a:rPr lang="el-GR" b="1" i="0" u="none" strike="noStrike" dirty="0">
+                <a:solidFill>
+                  <a:srgbClr val="222222"/>
+                </a:solidFill>
+                <a:effectLst/>
+                <a:latin typeface="times new roman" panose="02020603050405020304" pitchFamily="18" charset="0"/>
+              </a:rPr>
+              <a:t>λ</a:t>
+            </a:r>
+            <a:r>
+              <a:rPr lang="en-US" b="1" i="0" u="none" strike="noStrike" dirty="0">
+                <a:solidFill>
+                  <a:srgbClr val="222222"/>
+                </a:solidFill>
+                <a:effectLst/>
+                <a:latin typeface="times new roman" panose="02020603050405020304" pitchFamily="18" charset="0"/>
+              </a:rPr>
+              <a:t>)</a:t>
+            </a:r>
+            <a:endParaRPr lang="en-PH" b="1" dirty="0">
+              <a:latin typeface="+mn-lt"/>
+            </a:endParaRPr>
+          </a:p>
+        </p:txBody>
+      </p:sp>
+      <p:pic>
+        <p:nvPicPr>
+          <p:cNvPr id="4" name="Picture 3">
+            <a:extLst>
+              <a:ext uri="{FF2B5EF4-FFF2-40B4-BE49-F238E27FC236}">
+                <a16:creationId xmlns:a16="http://schemas.microsoft.com/office/drawing/2014/main" id="{C5E3EE53-34F7-FBAC-157D-8DAC7ABE5B0B}"/>
+              </a:ext>
+            </a:extLst>
+          </p:cNvPr>
+          <p:cNvPicPr>
+            <a:picLocks noChangeAspect="1"/>
+          </p:cNvPicPr>
+          <p:nvPr/>
+        </p:nvPicPr>
+        <p:blipFill>
+          <a:blip r:embed="rId2">
+            <a:extLst>
+              <a:ext uri="{28A0092B-C50C-407E-A947-70E740481C1C}">
+                <a14:useLocalDpi xmlns:a14="http://schemas.microsoft.com/office/drawing/2010/main" val="0"/>
+              </a:ext>
+            </a:extLst>
+          </a:blip>
+          <a:stretch>
+            <a:fillRect/>
+          </a:stretch>
+        </p:blipFill>
+        <p:spPr>
+          <a:xfrm>
+            <a:off x="2209800" y="1425773"/>
+            <a:ext cx="7772400" cy="4471584"/>
+          </a:xfrm>
+          <a:prstGeom prst="rect">
+            <a:avLst/>
+          </a:prstGeom>
+        </p:spPr>
+      </p:pic>
+    </p:spTree>
+    <p:extLst>
+      <p:ext uri="{BB962C8B-B14F-4D97-AF65-F5344CB8AC3E}">
+        <p14:creationId xmlns:p14="http://schemas.microsoft.com/office/powerpoint/2010/main" val="682645559"/>
+      </p:ext>
+    </p:extLst>
+  </p:cSld>
+  <p:clrMapOvr>
+    <a:masterClrMapping/>
+  </p:clrMapOvr>
+</p:sld>
+</file>
+
+<file path=ppt/slides/slide21.xml><?xml version="1.0" encoding="utf-8"?>
+<p:sld xmlns:a="http://schemas.openxmlformats.org/drawingml/2006/main" xmlns:r="http://schemas.openxmlformats.org/officeDocument/2006/relationships" xmlns:p="http://schemas.openxmlformats.org/presentationml/2006/main">
+  <p:cSld>
+    <p:spTree>
+      <p:nvGrpSpPr>
+        <p:cNvPr id="1" name=""/>
+        <p:cNvGrpSpPr/>
+        <p:nvPr/>
+      </p:nvGrpSpPr>
+      <p:grpSpPr>
+        <a:xfrm>
+          <a:off x="0" y="0"/>
+          <a:ext cx="0" cy="0"/>
+          <a:chOff x="0" y="0"/>
+          <a:chExt cx="0" cy="0"/>
+        </a:xfrm>
+      </p:grpSpPr>
+      <p:sp>
+        <p:nvSpPr>
+          <p:cNvPr id="6" name="TextBox 5">
+            <a:extLst>
+              <a:ext uri="{FF2B5EF4-FFF2-40B4-BE49-F238E27FC236}">
+                <a16:creationId xmlns:a16="http://schemas.microsoft.com/office/drawing/2014/main" id="{933CA7EB-D821-4578-A186-D330E9178EDE}"/>
+              </a:ext>
+            </a:extLst>
+          </p:cNvPr>
+          <p:cNvSpPr txBox="1"/>
+          <p:nvPr/>
+        </p:nvSpPr>
+        <p:spPr>
+          <a:xfrm>
+            <a:off x="87923" y="28551"/>
+            <a:ext cx="3622432" cy="338554"/>
+          </a:xfrm>
+          <a:prstGeom prst="rect">
+            <a:avLst/>
+          </a:prstGeom>
+          <a:noFill/>
+        </p:spPr>
+        <p:txBody>
+          <a:bodyPr wrap="square" rtlCol="0">
+            <a:spAutoFit/>
+          </a:bodyPr>
+          <a:lstStyle/>
+          <a:p>
+            <a:r>
+              <a:rPr lang="en-PH" sz="1600">
+                <a:solidFill>
+                  <a:schemeClr val="bg1"/>
+                </a:solidFill>
+                <a:latin typeface="Abadi" panose="020B0604020104020204" pitchFamily="34" charset="0"/>
+                <a:cs typeface="Aharoni" panose="020B0604020202020204" pitchFamily="2" charset="-79"/>
+              </a:rPr>
+              <a:t>INTRODUCTION TO COMPUTING</a:t>
+            </a:r>
+          </a:p>
+        </p:txBody>
+      </p:sp>
+      <p:sp>
+        <p:nvSpPr>
+          <p:cNvPr id="7" name="TextBox 6">
+            <a:extLst>
+              <a:ext uri="{FF2B5EF4-FFF2-40B4-BE49-F238E27FC236}">
+                <a16:creationId xmlns:a16="http://schemas.microsoft.com/office/drawing/2014/main" id="{9B128FD4-EE77-4086-837E-5EAF83B0DDD1}"/>
+              </a:ext>
+            </a:extLst>
+          </p:cNvPr>
+          <p:cNvSpPr txBox="1"/>
+          <p:nvPr/>
+        </p:nvSpPr>
+        <p:spPr>
+          <a:xfrm>
+            <a:off x="9182099" y="13190"/>
+            <a:ext cx="2948354" cy="338554"/>
+          </a:xfrm>
+          <a:prstGeom prst="rect">
+            <a:avLst/>
+          </a:prstGeom>
+          <a:noFill/>
+        </p:spPr>
+        <p:txBody>
+          <a:bodyPr wrap="square" rtlCol="0">
+            <a:spAutoFit/>
+          </a:bodyPr>
+          <a:lstStyle/>
+          <a:p>
+            <a:pPr algn="r"/>
+            <a:r>
+              <a:rPr lang="en-US" sz="1600">
+                <a:solidFill>
+                  <a:schemeClr val="bg1"/>
+                </a:solidFill>
+              </a:rPr>
+              <a:t>Course Code: CCINCOM/L</a:t>
+            </a:r>
+            <a:endParaRPr lang="en-PH" sz="1600">
+              <a:solidFill>
+                <a:schemeClr val="bg1"/>
+              </a:solidFill>
+              <a:latin typeface="Abadi" panose="020B0604020202020204" pitchFamily="34" charset="0"/>
+            </a:endParaRPr>
+          </a:p>
+        </p:txBody>
+      </p:sp>
+      <p:sp>
+        <p:nvSpPr>
+          <p:cNvPr id="8" name="TextBox 7">
+            <a:extLst>
+              <a:ext uri="{FF2B5EF4-FFF2-40B4-BE49-F238E27FC236}">
+                <a16:creationId xmlns:a16="http://schemas.microsoft.com/office/drawing/2014/main" id="{B95C7AD6-4918-4294-AA88-B72FB28833FE}"/>
+              </a:ext>
+            </a:extLst>
+          </p:cNvPr>
+          <p:cNvSpPr txBox="1"/>
+          <p:nvPr/>
+        </p:nvSpPr>
+        <p:spPr>
+          <a:xfrm>
+            <a:off x="0" y="6479929"/>
+            <a:ext cx="2461846" cy="338554"/>
+          </a:xfrm>
+          <a:prstGeom prst="rect">
+            <a:avLst/>
+          </a:prstGeom>
+          <a:noFill/>
+        </p:spPr>
+        <p:txBody>
+          <a:bodyPr wrap="square" rtlCol="0">
+            <a:spAutoFit/>
+          </a:bodyPr>
+          <a:lstStyle/>
+          <a:p>
+            <a:pPr algn="ctr"/>
+            <a:r>
+              <a:rPr lang="en-PH" sz="1600">
+                <a:solidFill>
+                  <a:schemeClr val="bg1"/>
+                </a:solidFill>
+                <a:latin typeface="Abadi" panose="020B0604020202020204" pitchFamily="34" charset="0"/>
+              </a:rPr>
+              <a:t>Joseph Marvin R. Imperial</a:t>
+            </a:r>
+          </a:p>
+        </p:txBody>
+      </p:sp>
+      <p:sp>
+        <p:nvSpPr>
+          <p:cNvPr id="9" name="TextBox 8">
+            <a:extLst>
+              <a:ext uri="{FF2B5EF4-FFF2-40B4-BE49-F238E27FC236}">
+                <a16:creationId xmlns:a16="http://schemas.microsoft.com/office/drawing/2014/main" id="{C3136E3D-4CFD-4EFC-98AB-367D0EF3C06B}"/>
+              </a:ext>
+            </a:extLst>
+          </p:cNvPr>
+          <p:cNvSpPr txBox="1"/>
+          <p:nvPr/>
+        </p:nvSpPr>
+        <p:spPr>
+          <a:xfrm>
+            <a:off x="7086601" y="6490896"/>
+            <a:ext cx="5105399" cy="338554"/>
+          </a:xfrm>
+          <a:prstGeom prst="rect">
+            <a:avLst/>
+          </a:prstGeom>
+          <a:noFill/>
+        </p:spPr>
+        <p:txBody>
+          <a:bodyPr wrap="square" rtlCol="0">
+            <a:spAutoFit/>
+          </a:bodyPr>
+          <a:lstStyle/>
+          <a:p>
+            <a:pPr algn="r"/>
+            <a:r>
+              <a:rPr lang="en-PH" sz="1600">
+                <a:solidFill>
+                  <a:schemeClr val="bg1"/>
+                </a:solidFill>
+                <a:latin typeface="Abadi" panose="020B0604020202020204" pitchFamily="34" charset="0"/>
+              </a:rPr>
+              <a:t>NU College of Computing and Information Technologies</a:t>
+            </a:r>
+          </a:p>
+        </p:txBody>
+      </p:sp>
+      <p:sp>
+        <p:nvSpPr>
+          <p:cNvPr id="12" name="TextBox 11">
+            <a:extLst>
+              <a:ext uri="{FF2B5EF4-FFF2-40B4-BE49-F238E27FC236}">
+                <a16:creationId xmlns:a16="http://schemas.microsoft.com/office/drawing/2014/main" id="{3B95F0FF-3312-4F15-A3FC-1E4D0A0C4CA3}"/>
+              </a:ext>
+            </a:extLst>
+          </p:cNvPr>
+          <p:cNvSpPr txBox="1"/>
+          <p:nvPr/>
+        </p:nvSpPr>
+        <p:spPr>
+          <a:xfrm>
+            <a:off x="2915382" y="1849692"/>
+            <a:ext cx="6224950" cy="461665"/>
+          </a:xfrm>
+          <a:prstGeom prst="rect">
+            <a:avLst/>
+          </a:prstGeom>
+          <a:noFill/>
+        </p:spPr>
+        <p:txBody>
+          <a:bodyPr wrap="square" rtlCol="0">
+            <a:spAutoFit/>
+          </a:bodyPr>
+          <a:lstStyle/>
+          <a:p>
+            <a:pPr algn="ctr"/>
+            <a:r>
+              <a:rPr lang="en-PH" sz="2400" b="1">
+                <a:solidFill>
+                  <a:schemeClr val="bg1"/>
+                </a:solidFill>
+                <a:latin typeface="Abadi" panose="020B0604020104020204" pitchFamily="34" charset="0"/>
+              </a:rPr>
+              <a:t>Review in Probability, Intro to RL Concepts</a:t>
+            </a:r>
+          </a:p>
+        </p:txBody>
+      </p:sp>
+      <p:sp>
+        <p:nvSpPr>
+          <p:cNvPr id="13" name="Rectangle 12">
+            <a:extLst>
+              <a:ext uri="{FF2B5EF4-FFF2-40B4-BE49-F238E27FC236}">
+                <a16:creationId xmlns:a16="http://schemas.microsoft.com/office/drawing/2014/main" id="{251B30DC-ACC5-404F-B51D-13612F115E3E}"/>
+              </a:ext>
+            </a:extLst>
+          </p:cNvPr>
+          <p:cNvSpPr/>
+          <p:nvPr/>
+        </p:nvSpPr>
+        <p:spPr>
+          <a:xfrm>
+            <a:off x="0" y="6462346"/>
+            <a:ext cx="12192000" cy="395654"/>
+          </a:xfrm>
+          <a:prstGeom prst="rect">
+            <a:avLst/>
+          </a:prstGeom>
+          <a:solidFill>
+            <a:schemeClr val="accent5">
+              <a:lumMod val="50000"/>
+            </a:schemeClr>
+          </a:solidFill>
+          <a:effectLst>
+            <a:outerShdw blurRad="50800" dist="38100" dir="2700000" algn="tl" rotWithShape="0">
+              <a:prstClr val="black">
+                <a:alpha val="40000"/>
+              </a:prstClr>
+            </a:outerShdw>
+          </a:effectLst>
+        </p:spPr>
+        <p:style>
+          <a:lnRef idx="2">
+            <a:schemeClr val="accent1">
+              <a:shade val="50000"/>
+            </a:schemeClr>
+          </a:lnRef>
+          <a:fillRef idx="1">
+            <a:schemeClr val="accent1"/>
+          </a:fillRef>
+          <a:effectRef idx="0">
+            <a:schemeClr val="accent1"/>
+          </a:effectRef>
+          <a:fontRef idx="minor">
+            <a:schemeClr val="lt1"/>
+          </a:fontRef>
+        </p:style>
+        <p:txBody>
+          <a:bodyPr rtlCol="0" anchor="ctr"/>
+          <a:lstStyle/>
+          <a:p>
+            <a:pPr algn="ctr"/>
+            <a:endParaRPr lang="en-PH"/>
+          </a:p>
+        </p:txBody>
+      </p:sp>
+      <p:sp>
+        <p:nvSpPr>
+          <p:cNvPr id="14" name="TextBox 13">
+            <a:extLst>
+              <a:ext uri="{FF2B5EF4-FFF2-40B4-BE49-F238E27FC236}">
+                <a16:creationId xmlns:a16="http://schemas.microsoft.com/office/drawing/2014/main" id="{ACC57CA2-30CA-4DDD-A941-8B9CC393DAFA}"/>
+              </a:ext>
+            </a:extLst>
+          </p:cNvPr>
+          <p:cNvSpPr txBox="1"/>
+          <p:nvPr/>
+        </p:nvSpPr>
+        <p:spPr>
+          <a:xfrm>
+            <a:off x="0" y="6490896"/>
+            <a:ext cx="3622432" cy="338554"/>
+          </a:xfrm>
+          <a:prstGeom prst="rect">
+            <a:avLst/>
+          </a:prstGeom>
+          <a:noFill/>
+        </p:spPr>
+        <p:txBody>
+          <a:bodyPr wrap="square" rtlCol="0">
+            <a:spAutoFit/>
+          </a:bodyPr>
+          <a:lstStyle/>
+          <a:p>
+            <a:r>
+              <a:rPr lang="en-PH" sz="1600">
+                <a:solidFill>
+                  <a:schemeClr val="bg1"/>
+                </a:solidFill>
+                <a:latin typeface="Abadi" panose="020B0604020104020204" pitchFamily="34" charset="0"/>
+                <a:cs typeface="Aharoni" panose="020B0604020202020204" pitchFamily="2" charset="-79"/>
+              </a:rPr>
+              <a:t>REINFORCEMENT LEARNING</a:t>
+            </a:r>
+          </a:p>
+        </p:txBody>
+      </p:sp>
+      <p:sp>
+        <p:nvSpPr>
+          <p:cNvPr id="15" name="TextBox 14">
+            <a:extLst>
+              <a:ext uri="{FF2B5EF4-FFF2-40B4-BE49-F238E27FC236}">
+                <a16:creationId xmlns:a16="http://schemas.microsoft.com/office/drawing/2014/main" id="{31237222-F604-49F1-8989-AF06AF20EDD3}"/>
+              </a:ext>
+            </a:extLst>
+          </p:cNvPr>
+          <p:cNvSpPr txBox="1"/>
+          <p:nvPr/>
+        </p:nvSpPr>
+        <p:spPr>
+          <a:xfrm>
+            <a:off x="9243646" y="6490896"/>
+            <a:ext cx="2948354" cy="338554"/>
+          </a:xfrm>
+          <a:prstGeom prst="rect">
+            <a:avLst/>
+          </a:prstGeom>
+          <a:noFill/>
+        </p:spPr>
+        <p:txBody>
+          <a:bodyPr wrap="square" rtlCol="0">
+            <a:spAutoFit/>
+          </a:bodyPr>
+          <a:lstStyle/>
+          <a:p>
+            <a:pPr algn="r"/>
+            <a:r>
+              <a:rPr lang="en-US" sz="1600">
+                <a:solidFill>
+                  <a:schemeClr val="bg1"/>
+                </a:solidFill>
+                <a:latin typeface="Abadi" panose="020B0604020104020204" pitchFamily="34" charset="0"/>
+              </a:rPr>
+              <a:t>Course Code: CCRNFLRL</a:t>
+            </a:r>
+            <a:endParaRPr lang="en-PH" sz="1600">
+              <a:solidFill>
+                <a:schemeClr val="bg1"/>
+              </a:solidFill>
+              <a:latin typeface="Abadi" panose="020B0604020104020204" pitchFamily="34" charset="0"/>
+            </a:endParaRPr>
+          </a:p>
+        </p:txBody>
+      </p:sp>
+      <p:sp>
+        <p:nvSpPr>
+          <p:cNvPr id="5" name="Title 4">
+            <a:extLst>
+              <a:ext uri="{FF2B5EF4-FFF2-40B4-BE49-F238E27FC236}">
+                <a16:creationId xmlns:a16="http://schemas.microsoft.com/office/drawing/2014/main" id="{EC47D021-EEC4-42AC-B4C3-BC584CB5BC9D}"/>
+              </a:ext>
+            </a:extLst>
+          </p:cNvPr>
+          <p:cNvSpPr>
+            <a:spLocks noGrp="1"/>
+          </p:cNvSpPr>
+          <p:nvPr>
+            <p:ph type="title"/>
+          </p:nvPr>
+        </p:nvSpPr>
+        <p:spPr>
+          <a:xfrm>
+            <a:off x="352425" y="292273"/>
+            <a:ext cx="11458574" cy="869778"/>
+          </a:xfrm>
+        </p:spPr>
+        <p:txBody>
+          <a:bodyPr/>
+          <a:lstStyle/>
+          <a:p>
+            <a:r>
+              <a:rPr lang="en-US" b="1" dirty="0">
+                <a:latin typeface="+mn-lt"/>
+              </a:rPr>
+              <a:t>References</a:t>
+            </a:r>
+            <a:endParaRPr lang="en-PH" b="1" dirty="0">
+              <a:latin typeface="+mn-lt"/>
+            </a:endParaRPr>
+          </a:p>
+        </p:txBody>
+      </p:sp>
+      <p:sp>
+        <p:nvSpPr>
+          <p:cNvPr id="10" name="Content Placeholder 9">
+            <a:extLst>
+              <a:ext uri="{FF2B5EF4-FFF2-40B4-BE49-F238E27FC236}">
+                <a16:creationId xmlns:a16="http://schemas.microsoft.com/office/drawing/2014/main" id="{D5BBEC35-40CA-42D4-BC38-E13B39A6DA8E}"/>
+              </a:ext>
+            </a:extLst>
+          </p:cNvPr>
+          <p:cNvSpPr>
+            <a:spLocks noGrp="1"/>
+          </p:cNvSpPr>
+          <p:nvPr>
+            <p:ph idx="1"/>
+          </p:nvPr>
+        </p:nvSpPr>
+        <p:spPr>
+          <a:xfrm>
+            <a:off x="380999" y="1352550"/>
+            <a:ext cx="11343641" cy="4905375"/>
+          </a:xfrm>
+        </p:spPr>
+        <p:txBody>
+          <a:bodyPr>
+            <a:normAutofit/>
+          </a:bodyPr>
+          <a:lstStyle/>
+          <a:p>
+            <a:pPr marL="457200" indent="-457200">
+              <a:buFont typeface="+mj-lt"/>
+              <a:buAutoNum type="arabicPeriod"/>
+            </a:pPr>
+            <a:r>
+              <a:rPr lang="en-US" sz="2000" dirty="0"/>
+              <a:t>Images are licensed with Creative Commons. Can use without citing.</a:t>
+            </a:r>
+          </a:p>
+          <a:p>
+            <a:pPr marL="457200" indent="-457200">
+              <a:buFont typeface="+mj-lt"/>
+              <a:buAutoNum type="arabicPeriod"/>
+            </a:pPr>
+            <a:r>
+              <a:rPr lang="en-US" sz="2000" dirty="0"/>
+              <a:t>Prof. Emma </a:t>
+            </a:r>
+            <a:r>
+              <a:rPr lang="en-US" sz="2000" dirty="0" err="1"/>
+              <a:t>Brunskill’s</a:t>
+            </a:r>
+            <a:r>
+              <a:rPr lang="en-US" sz="2000" dirty="0"/>
+              <a:t> slides (CS234RL). </a:t>
+            </a:r>
+            <a:r>
+              <a:rPr lang="en-US" sz="2000" dirty="0">
+                <a:hlinkClick r:id="rId2"/>
+              </a:rPr>
+              <a:t>https://web.stanford.edu/class/cs234/slides/lecture1.pdf</a:t>
+            </a:r>
+            <a:endParaRPr lang="en-US" sz="2000" dirty="0"/>
+          </a:p>
+          <a:p>
+            <a:pPr marL="457200" indent="-457200">
+              <a:buFont typeface="+mj-lt"/>
+              <a:buAutoNum type="arabicPeriod"/>
+            </a:pPr>
+            <a:r>
+              <a:rPr lang="en-US" sz="2000" dirty="0"/>
+              <a:t>David Silver’s slides. </a:t>
+            </a:r>
+            <a:r>
+              <a:rPr lang="en-US" sz="2000" dirty="0">
+                <a:hlinkClick r:id="rId3"/>
+              </a:rPr>
+              <a:t>https://www.davidsilver.uk/wp-content/uploads/2020/03/intro_RL.pdf</a:t>
+            </a:r>
+            <a:endParaRPr lang="en-US" sz="2000" dirty="0"/>
+          </a:p>
+          <a:p>
+            <a:pPr marL="0" indent="0">
+              <a:buNone/>
+            </a:pPr>
+            <a:endParaRPr lang="en-US" sz="2000" dirty="0"/>
+          </a:p>
+        </p:txBody>
+      </p:sp>
+    </p:spTree>
+    <p:extLst>
+      <p:ext uri="{BB962C8B-B14F-4D97-AF65-F5344CB8AC3E}">
+        <p14:creationId xmlns:p14="http://schemas.microsoft.com/office/powerpoint/2010/main" val="31654266"/>
       </p:ext>
     </p:extLst>
   </p:cSld>
@@ -13860,8 +16524,8 @@
           </a:p>
         </p:txBody>
       </p:sp>
-      <mc:AlternateContent xmlns:mc="http://schemas.openxmlformats.org/markup-compatibility/2006">
-        <mc:Choice xmlns:a14="http://schemas.microsoft.com/office/drawing/2010/main" Requires="a14">
+      <mc:AlternateContent xmlns:mc="http://schemas.openxmlformats.org/markup-compatibility/2006" xmlns:a14="http://schemas.microsoft.com/office/drawing/2010/main">
+        <mc:Choice Requires="a14">
           <p:sp>
             <p:nvSpPr>
               <p:cNvPr id="10" name="Content Placeholder 9">
@@ -13968,7 +16632,7 @@
             </p:txBody>
           </p:sp>
         </mc:Choice>
-        <mc:Fallback>
+        <mc:Fallback xmlns="">
           <p:sp>
             <p:nvSpPr>
               <p:cNvPr id="10" name="Content Placeholder 9">
@@ -14042,8 +16706,8 @@
           </a:prstGeom>
         </p:spPr>
       </p:pic>
-      <mc:AlternateContent xmlns:mc="http://schemas.openxmlformats.org/markup-compatibility/2006">
-        <mc:Choice xmlns:a14="http://schemas.microsoft.com/office/drawing/2010/main" Requires="a14">
+      <mc:AlternateContent xmlns:mc="http://schemas.openxmlformats.org/markup-compatibility/2006" xmlns:a14="http://schemas.microsoft.com/office/drawing/2010/main">
+        <mc:Choice Requires="a14">
           <p:sp>
             <p:nvSpPr>
               <p:cNvPr id="11" name="TextBox 10">
@@ -14115,7 +16779,7 @@
                     <m:sSub>
                       <m:sSubPr>
                         <m:ctrlPr>
-                          <a:rPr lang="en-US" sz="2200" b="1" smtClean="0">
+                          <a:rPr lang="en-US" sz="2200" b="1" i="1" smtClean="0">
                             <a:latin typeface="Cambria Math" panose="02040503050406030204" pitchFamily="18" charset="0"/>
                             <a:ea typeface="Cambria Math" panose="02040503050406030204" pitchFamily="18" charset="0"/>
                           </a:rPr>
@@ -14202,7 +16866,7 @@
             </p:txBody>
           </p:sp>
         </mc:Choice>
-        <mc:Fallback>
+        <mc:Fallback xmlns="">
           <p:sp>
             <p:nvSpPr>
               <p:cNvPr id="11" name="TextBox 10">
@@ -14247,8 +16911,8 @@
           </p:sp>
         </mc:Fallback>
       </mc:AlternateContent>
-      <mc:AlternateContent xmlns:mc="http://schemas.openxmlformats.org/markup-compatibility/2006">
-        <mc:Choice xmlns:a14="http://schemas.microsoft.com/office/drawing/2010/main" Requires="a14">
+      <mc:AlternateContent xmlns:mc="http://schemas.openxmlformats.org/markup-compatibility/2006" xmlns:a14="http://schemas.microsoft.com/office/drawing/2010/main">
+        <mc:Choice Requires="a14">
           <p:sp>
             <p:nvSpPr>
               <p:cNvPr id="12" name="TextBox 11">
@@ -14393,7 +17057,7 @@
             </p:txBody>
           </p:sp>
         </mc:Choice>
-        <mc:Fallback>
+        <mc:Fallback xmlns="">
           <p:sp>
             <p:nvSpPr>
               <p:cNvPr id="12" name="TextBox 11">
@@ -19177,15 +21841,36 @@
 </file>
 
 <file path=customXml/item10.xml><?xml version="1.0" encoding="utf-8"?>
-<?mso-contentType ?>
-<FormTemplates xmlns="http://schemas.microsoft.com/sharepoint/v3/contenttype/forms">
-  <Display>DocumentLibraryForm</Display>
-  <Edit>DocumentLibraryForm</Edit>
-  <New>DocumentLibraryForm</New>
-</FormTemplates>
+<Control xmlns="http://schemas.microsoft.com/VisualStudio/2011/storyboarding/control">
+  <Id Name="8ace2fdb-12ac-4077-a484-31b1b60ebf69" Revision="1" Stencil="System.MyShapes" StencilVersion="1.0"/>
+</Control>
 </file>
 
 <file path=customXml/item11.xml><?xml version="1.0" encoding="utf-8"?>
+<Control xmlns="http://schemas.microsoft.com/VisualStudio/2011/storyboarding/control">
+  <Id Name="8ace2fdb-12ac-4077-a484-31b1b60ebf69" Revision="1" Stencil="System.MyShapes" StencilVersion="1.0"/>
+</Control>
+</file>
+
+<file path=customXml/item2.xml><?xml version="1.0" encoding="utf-8"?>
+<Control xmlns="http://schemas.microsoft.com/VisualStudio/2011/storyboarding/control">
+  <Id Name="8ace2fdb-12ac-4077-a484-31b1b60ebf69" Revision="1" Stencil="System.MyShapes" StencilVersion="1.0"/>
+</Control>
+</file>
+
+<file path=customXml/item3.xml><?xml version="1.0" encoding="utf-8"?>
+<Control xmlns="http://schemas.microsoft.com/VisualStudio/2011/storyboarding/control">
+  <Id Name="8ace2fdb-12ac-4077-a484-31b1b60ebf69" Revision="1" Stencil="System.MyShapes" StencilVersion="1.0"/>
+</Control>
+</file>
+
+<file path=customXml/item4.xml><?xml version="1.0" encoding="utf-8"?>
+<Control xmlns="http://schemas.microsoft.com/VisualStudio/2011/storyboarding/control">
+  <Id Name="8ace2fdb-12ac-4077-a484-31b1b60ebf69" Revision="1" Stencil="System.MyShapes" StencilVersion="1.0"/>
+</Control>
+</file>
+
+<file path=customXml/item5.xml><?xml version="1.0" encoding="utf-8"?>
 <ct:contentTypeSchema xmlns:ct="http://schemas.microsoft.com/office/2006/metadata/contentType" xmlns:ma="http://schemas.microsoft.com/office/2006/metadata/properties/metaAttributes" ct:_="" ma:_="" ma:contentTypeName="Document" ma:contentTypeID="0x010100A8972596D83CB9448D5CC5920EF207E5" ma:contentTypeVersion="15" ma:contentTypeDescription="Create a new document." ma:contentTypeScope="" ma:versionID="e0bf2008eb45d6d5fc139be6c8039e46">
   <xsd:schema xmlns:xsd="http://www.w3.org/2001/XMLSchema" xmlns:xs="http://www.w3.org/2001/XMLSchema" xmlns:p="http://schemas.microsoft.com/office/2006/metadata/properties" xmlns:ns2="83665817-2bf1-470e-9d34-a1cdf51135fc" xmlns:ns3="8635a931-6b84-420a-938b-bf6e93596a85" targetNamespace="http://schemas.microsoft.com/office/2006/metadata/properties" ma:root="true" ma:fieldsID="b3f89756f7e2a2b7ac115775bf8004ea" ns2:_="" ns3:_="">
     <xsd:import namespace="83665817-2bf1-470e-9d34-a1cdf51135fc"/>
@@ -19422,25 +22107,7 @@
 </ct:contentTypeSchema>
 </file>
 
-<file path=customXml/item2.xml><?xml version="1.0" encoding="utf-8"?>
-<Control xmlns="http://schemas.microsoft.com/VisualStudio/2011/storyboarding/control">
-  <Id Name="8ace2fdb-12ac-4077-a484-31b1b60ebf69" Revision="1" Stencil="System.MyShapes" StencilVersion="1.0"/>
-</Control>
-</file>
-
-<file path=customXml/item3.xml><?xml version="1.0" encoding="utf-8"?>
-<Control xmlns="http://schemas.microsoft.com/VisualStudio/2011/storyboarding/control">
-  <Id Name="8ace2fdb-12ac-4077-a484-31b1b60ebf69" Revision="1" Stencil="System.MyShapes" StencilVersion="1.0"/>
-</Control>
-</file>
-
-<file path=customXml/item4.xml><?xml version="1.0" encoding="utf-8"?>
-<Control xmlns="http://schemas.microsoft.com/VisualStudio/2011/storyboarding/control">
-  <Id Name="8ace2fdb-12ac-4077-a484-31b1b60ebf69" Revision="1" Stencil="System.MyShapes" StencilVersion="1.0"/>
-</Control>
-</file>
-
-<file path=customXml/item5.xml><?xml version="1.0" encoding="utf-8"?>
+<file path=customXml/item6.xml><?xml version="1.0" encoding="utf-8"?>
 <p:properties xmlns:p="http://schemas.microsoft.com/office/2006/metadata/properties" xmlns:xsi="http://www.w3.org/2001/XMLSchema-instance" xmlns:pc="http://schemas.microsoft.com/office/infopath/2007/PartnerControls">
   <documentManagement>
     <TaxCatchAll xmlns="8635a931-6b84-420a-938b-bf6e93596a85" xsi:nil="true"/>
@@ -19451,16 +22118,13 @@
 </p:properties>
 </file>
 
-<file path=customXml/item6.xml><?xml version="1.0" encoding="utf-8"?>
-<Control xmlns="http://schemas.microsoft.com/VisualStudio/2011/storyboarding/control">
-  <Id Name="8ace2fdb-12ac-4077-a484-31b1b60ebf69" Revision="1" Stencil="System.MyShapes" StencilVersion="1.0"/>
-</Control>
-</file>
-
 <file path=customXml/item7.xml><?xml version="1.0" encoding="utf-8"?>
-<Control xmlns="http://schemas.microsoft.com/VisualStudio/2011/storyboarding/control">
-  <Id Name="8ace2fdb-12ac-4077-a484-31b1b60ebf69" Revision="1" Stencil="System.MyShapes" StencilVersion="1.0"/>
-</Control>
+<?mso-contentType ?>
+<FormTemplates xmlns="http://schemas.microsoft.com/sharepoint/v3/contenttype/forms">
+  <Display>DocumentLibraryForm</Display>
+  <Edit>DocumentLibraryForm</Edit>
+  <New>DocumentLibraryForm</New>
+</FormTemplates>
 </file>
 
 <file path=customXml/item8.xml><?xml version="1.0" encoding="utf-8"?>
@@ -19476,6 +22140,38 @@
 </file>
 
 <file path=customXml/itemProps1.xml><?xml version="1.0" encoding="utf-8"?>
+<ds:datastoreItem xmlns:ds="http://schemas.openxmlformats.org/officeDocument/2006/customXml" ds:itemID="{1E432C16-7313-413A-AE06-D8B8B05337A0}">
+  <ds:schemaRefs>
+    <ds:schemaRef ds:uri="http://schemas.microsoft.com/VisualStudio/2011/storyboarding/control"/>
+  </ds:schemaRefs>
+</ds:datastoreItem>
+</file>
+
+<file path=customXml/itemProps10.xml><?xml version="1.0" encoding="utf-8"?>
+<ds:datastoreItem xmlns:ds="http://schemas.openxmlformats.org/officeDocument/2006/customXml" ds:itemID="{C4D067AF-DC92-4F11-82F5-13007749D8F7}">
+  <ds:schemaRefs>
+    <ds:schemaRef ds:uri="http://schemas.microsoft.com/VisualStudio/2011/storyboarding/control"/>
+  </ds:schemaRefs>
+</ds:datastoreItem>
+</file>
+
+<file path=customXml/itemProps11.xml><?xml version="1.0" encoding="utf-8"?>
+<ds:datastoreItem xmlns:ds="http://schemas.openxmlformats.org/officeDocument/2006/customXml" ds:itemID="{CAEBBB30-5DD1-4E52-82DE-A02E4733D29A}">
+  <ds:schemaRefs>
+    <ds:schemaRef ds:uri="http://schemas.microsoft.com/VisualStudio/2011/storyboarding/control"/>
+  </ds:schemaRefs>
+</ds:datastoreItem>
+</file>
+
+<file path=customXml/itemProps2.xml><?xml version="1.0" encoding="utf-8"?>
+<ds:datastoreItem xmlns:ds="http://schemas.openxmlformats.org/officeDocument/2006/customXml" ds:itemID="{11BDA43E-947F-4629-A7CA-0F1298F3BE36}">
+  <ds:schemaRefs>
+    <ds:schemaRef ds:uri="http://schemas.microsoft.com/VisualStudio/2011/storyboarding/control"/>
+  </ds:schemaRefs>
+</ds:datastoreItem>
+</file>
+
+<file path=customXml/itemProps3.xml><?xml version="1.0" encoding="utf-8"?>
 <ds:datastoreItem xmlns:ds="http://schemas.openxmlformats.org/officeDocument/2006/customXml" ds:itemID="{F79BED0A-E20E-4F16-91D3-BB18BCF17AE7}">
   <ds:schemaRefs>
     <ds:schemaRef ds:uri="http://schemas.microsoft.com/VisualStudio/2011/storyboarding/control"/>
@@ -19483,15 +22179,15 @@
 </ds:datastoreItem>
 </file>
 
-<file path=customXml/itemProps10.xml><?xml version="1.0" encoding="utf-8"?>
-<ds:datastoreItem xmlns:ds="http://schemas.openxmlformats.org/officeDocument/2006/customXml" ds:itemID="{F166DAC8-4ECC-4130-9B37-BEDCB54573DF}">
+<file path=customXml/itemProps4.xml><?xml version="1.0" encoding="utf-8"?>
+<ds:datastoreItem xmlns:ds="http://schemas.openxmlformats.org/officeDocument/2006/customXml" ds:itemID="{C0AE690A-6DA2-4539-97E4-9CACEDAE07A0}">
   <ds:schemaRefs>
-    <ds:schemaRef ds:uri="http://schemas.microsoft.com/sharepoint/v3/contenttype/forms"/>
+    <ds:schemaRef ds:uri="http://schemas.microsoft.com/VisualStudio/2011/storyboarding/control"/>
   </ds:schemaRefs>
 </ds:datastoreItem>
 </file>
 
-<file path=customXml/itemProps11.xml><?xml version="1.0" encoding="utf-8"?>
+<file path=customXml/itemProps5.xml><?xml version="1.0" encoding="utf-8"?>
 <ds:datastoreItem xmlns:ds="http://schemas.openxmlformats.org/officeDocument/2006/customXml" ds:itemID="{BB604A8B-05E3-451E-8C75-68576FF9640A}">
   <ds:schemaRefs>
     <ds:schemaRef ds:uri="http://schemas.microsoft.com/office/2006/metadata/contentType"/>
@@ -19510,31 +22206,7 @@
 </ds:datastoreItem>
 </file>
 
-<file path=customXml/itemProps2.xml><?xml version="1.0" encoding="utf-8"?>
-<ds:datastoreItem xmlns:ds="http://schemas.openxmlformats.org/officeDocument/2006/customXml" ds:itemID="{11BDA43E-947F-4629-A7CA-0F1298F3BE36}">
-  <ds:schemaRefs>
-    <ds:schemaRef ds:uri="http://schemas.microsoft.com/VisualStudio/2011/storyboarding/control"/>
-  </ds:schemaRefs>
-</ds:datastoreItem>
-</file>
-
-<file path=customXml/itemProps3.xml><?xml version="1.0" encoding="utf-8"?>
-<ds:datastoreItem xmlns:ds="http://schemas.openxmlformats.org/officeDocument/2006/customXml" ds:itemID="{CAEBBB30-5DD1-4E52-82DE-A02E4733D29A}">
-  <ds:schemaRefs>
-    <ds:schemaRef ds:uri="http://schemas.microsoft.com/VisualStudio/2011/storyboarding/control"/>
-  </ds:schemaRefs>
-</ds:datastoreItem>
-</file>
-
-<file path=customXml/itemProps4.xml><?xml version="1.0" encoding="utf-8"?>
-<ds:datastoreItem xmlns:ds="http://schemas.openxmlformats.org/officeDocument/2006/customXml" ds:itemID="{AD4724DF-B3D7-4FCF-AA8F-856D3FC7F828}">
-  <ds:schemaRefs>
-    <ds:schemaRef ds:uri="http://schemas.microsoft.com/VisualStudio/2011/storyboarding/control"/>
-  </ds:schemaRefs>
-</ds:datastoreItem>
-</file>
-
-<file path=customXml/itemProps5.xml><?xml version="1.0" encoding="utf-8"?>
+<file path=customXml/itemProps6.xml><?xml version="1.0" encoding="utf-8"?>
 <ds:datastoreItem xmlns:ds="http://schemas.openxmlformats.org/officeDocument/2006/customXml" ds:itemID="{5999E179-E0BD-40A6-9179-FDE9AD04F1CC}">
   <ds:schemaRefs>
     <ds:schemaRef ds:uri="http://schemas.microsoft.com/office/2006/metadata/properties"/>
@@ -19545,24 +22217,16 @@
 </ds:datastoreItem>
 </file>
 
-<file path=customXml/itemProps6.xml><?xml version="1.0" encoding="utf-8"?>
-<ds:datastoreItem xmlns:ds="http://schemas.openxmlformats.org/officeDocument/2006/customXml" ds:itemID="{C0AE690A-6DA2-4539-97E4-9CACEDAE07A0}">
+<file path=customXml/itemProps7.xml><?xml version="1.0" encoding="utf-8"?>
+<ds:datastoreItem xmlns:ds="http://schemas.openxmlformats.org/officeDocument/2006/customXml" ds:itemID="{F166DAC8-4ECC-4130-9B37-BEDCB54573DF}">
   <ds:schemaRefs>
-    <ds:schemaRef ds:uri="http://schemas.microsoft.com/VisualStudio/2011/storyboarding/control"/>
-  </ds:schemaRefs>
-</ds:datastoreItem>
-</file>
-
-<file path=customXml/itemProps7.xml><?xml version="1.0" encoding="utf-8"?>
-<ds:datastoreItem xmlns:ds="http://schemas.openxmlformats.org/officeDocument/2006/customXml" ds:itemID="{1E432C16-7313-413A-AE06-D8B8B05337A0}">
-  <ds:schemaRefs>
-    <ds:schemaRef ds:uri="http://schemas.microsoft.com/VisualStudio/2011/storyboarding/control"/>
+    <ds:schemaRef ds:uri="http://schemas.microsoft.com/sharepoint/v3/contenttype/forms"/>
   </ds:schemaRefs>
 </ds:datastoreItem>
 </file>
 
 <file path=customXml/itemProps8.xml><?xml version="1.0" encoding="utf-8"?>
-<ds:datastoreItem xmlns:ds="http://schemas.openxmlformats.org/officeDocument/2006/customXml" ds:itemID="{C4D067AF-DC92-4F11-82F5-13007749D8F7}">
+<ds:datastoreItem xmlns:ds="http://schemas.openxmlformats.org/officeDocument/2006/customXml" ds:itemID="{AD4724DF-B3D7-4FCF-AA8F-856D3FC7F828}">
   <ds:schemaRefs>
     <ds:schemaRef ds:uri="http://schemas.microsoft.com/VisualStudio/2011/storyboarding/control"/>
   </ds:schemaRefs>

</xml_diff>